<commit_message>
added login and register basic functions to server
</commit_message>
<xml_diff>
--- a/docs/vision/doc/sprint1Presentation.pptx
+++ b/docs/vision/doc/sprint1Presentation.pptx
@@ -2,7 +2,7 @@
 <file path=ppt/presentation.xml><?xml version="1.0" encoding="utf-8"?>
 <p:presentation xmlns:a="http://schemas.openxmlformats.org/drawingml/2006/main" xmlns:r="http://schemas.openxmlformats.org/officeDocument/2006/relationships" xmlns:p="http://schemas.openxmlformats.org/presentationml/2006/main" rtl="1" saveSubsetFonts="1">
   <p:sldMasterIdLst>
-    <p:sldMasterId id="2147483648" r:id="rId1"/>
+    <p:sldMasterId id="2147483720" r:id="rId1"/>
   </p:sldMasterIdLst>
   <p:sldIdLst>
     <p:sldId id="256" r:id="rId2"/>
@@ -109,11 +109,16 @@
       </a:defRPr>
     </a:lvl9pPr>
   </p:defaultTextStyle>
+  <p:extLst>
+    <p:ext uri="{EFAFB233-063F-42B5-8137-9DF3F51BA10A}">
+      <p15:sldGuideLst xmlns:p15="http://schemas.microsoft.com/office/powerpoint/2012/main"/>
+    </p:ext>
+  </p:extLst>
 </p:presentation>
 </file>
 
 <file path=ppt/slideLayouts/slideLayout1.xml><?xml version="1.0" encoding="utf-8"?>
-<p:sldLayout xmlns:a="http://schemas.openxmlformats.org/drawingml/2006/main" xmlns:r="http://schemas.openxmlformats.org/officeDocument/2006/relationships" xmlns:p="http://schemas.openxmlformats.org/presentationml/2006/main" type="title" preserve="1">
+<p:sldLayout xmlns:a="http://schemas.openxmlformats.org/drawingml/2006/main" xmlns:r="http://schemas.openxmlformats.org/officeDocument/2006/relationships" xmlns:p="http://schemas.openxmlformats.org/presentationml/2006/main" showMasterSp="0" type="title" preserve="1">
   <p:cSld name="שקופית כותרת">
     <p:spTree>
       <p:nvGrpSpPr>
@@ -131,25 +136,111 @@
       </p:grpSpPr>
       <p:sp>
         <p:nvSpPr>
-          <p:cNvPr id="2" name="כותרת 1"/>
-          <p:cNvSpPr>
-            <a:spLocks noGrp="1"/>
-          </p:cNvSpPr>
-          <p:nvPr>
-            <p:ph type="ctrTitle"/>
-          </p:nvPr>
+          <p:cNvPr id="7" name="Rectangle 6"/>
+          <p:cNvSpPr/>
+          <p:nvPr/>
         </p:nvSpPr>
         <p:spPr>
           <a:xfrm>
-            <a:off x="1524000" y="1122363"/>
-            <a:ext cx="9144000" cy="2387600"/>
+            <a:off x="0" y="761999"/>
+            <a:ext cx="9141619" cy="5334001"/>
+          </a:xfrm>
+          <a:prstGeom prst="rect">
+            <a:avLst/>
+          </a:prstGeom>
+          <a:solidFill>
+            <a:schemeClr val="accent1">
+              <a:alpha val="95000"/>
+            </a:schemeClr>
+          </a:solidFill>
+          <a:ln>
+            <a:noFill/>
+          </a:ln>
+        </p:spPr>
+        <p:style>
+          <a:lnRef idx="2">
+            <a:schemeClr val="accent1">
+              <a:shade val="50000"/>
+            </a:schemeClr>
+          </a:lnRef>
+          <a:fillRef idx="1">
+            <a:schemeClr val="accent1"/>
+          </a:fillRef>
+          <a:effectRef idx="0">
+            <a:schemeClr val="accent1"/>
+          </a:effectRef>
+          <a:fontRef idx="minor">
+            <a:schemeClr val="lt1"/>
+          </a:fontRef>
+        </p:style>
+      </p:sp>
+      <p:sp>
+        <p:nvSpPr>
+          <p:cNvPr id="8" name="Rectangle 7"/>
+          <p:cNvSpPr/>
+          <p:nvPr/>
+        </p:nvSpPr>
+        <p:spPr>
+          <a:xfrm>
+            <a:off x="9270263" y="761999"/>
+            <a:ext cx="2925318" cy="5334001"/>
+          </a:xfrm>
+          <a:prstGeom prst="rect">
+            <a:avLst/>
+          </a:prstGeom>
+          <a:solidFill>
+            <a:schemeClr val="accent1">
+              <a:alpha val="40000"/>
+            </a:schemeClr>
+          </a:solidFill>
+          <a:ln>
+            <a:noFill/>
+          </a:ln>
+        </p:spPr>
+        <p:style>
+          <a:lnRef idx="2">
+            <a:schemeClr val="accent1">
+              <a:shade val="50000"/>
+            </a:schemeClr>
+          </a:lnRef>
+          <a:fillRef idx="1">
+            <a:schemeClr val="accent1"/>
+          </a:fillRef>
+          <a:effectRef idx="0">
+            <a:schemeClr val="accent1"/>
+          </a:effectRef>
+          <a:fontRef idx="minor">
+            <a:schemeClr val="lt1"/>
+          </a:fontRef>
+        </p:style>
+      </p:sp>
+      <p:sp>
+        <p:nvSpPr>
+          <p:cNvPr id="2" name="Title 1"/>
+          <p:cNvSpPr>
+            <a:spLocks noGrp="1"/>
+          </p:cNvSpPr>
+          <p:nvPr>
+            <p:ph type="ctrTitle"/>
+          </p:nvPr>
+        </p:nvSpPr>
+        <p:spPr>
+          <a:xfrm>
+            <a:off x="1069848" y="1298448"/>
+            <a:ext cx="7315200" cy="3255264"/>
           </a:xfrm>
         </p:spPr>
         <p:txBody>
-          <a:bodyPr anchor="b"/>
+          <a:bodyPr anchor="b">
+            <a:normAutofit/>
+          </a:bodyPr>
           <a:lstStyle>
-            <a:lvl1pPr algn="ctr">
-              <a:defRPr sz="6000"/>
+            <a:lvl1pPr algn="l">
+              <a:defRPr sz="5900" spc="-100" baseline="0">
+                <a:solidFill>
+                  <a:srgbClr val="FFFFFF"/>
+                </a:solidFill>
+              </a:defRPr>
             </a:lvl1pPr>
           </a:lstStyle>
           <a:p>
@@ -157,13 +248,13 @@
               <a:rPr lang="he-IL" smtClean="0"/>
               <a:t>לחץ כדי לערוך סגנון כותרת של תבנית בסיס</a:t>
             </a:r>
-            <a:endParaRPr lang="he-IL"/>
-          </a:p>
-        </p:txBody>
-      </p:sp>
-      <p:sp>
-        <p:nvSpPr>
-          <p:cNvPr id="3" name="כותרת משנה 2"/>
+            <a:endParaRPr lang="en-US" dirty="0"/>
+          </a:p>
+        </p:txBody>
+      </p:sp>
+      <p:sp>
+        <p:nvSpPr>
+          <p:cNvPr id="3" name="Subtitle 2"/>
           <p:cNvSpPr>
             <a:spLocks noGrp="1"/>
           </p:cNvSpPr>
@@ -173,48 +264,57 @@
         </p:nvSpPr>
         <p:spPr>
           <a:xfrm>
-            <a:off x="1524000" y="3602038"/>
-            <a:ext cx="9144000" cy="1655762"/>
+            <a:off x="1100015" y="4670246"/>
+            <a:ext cx="7315200" cy="914400"/>
           </a:xfrm>
         </p:spPr>
         <p:txBody>
-          <a:bodyPr/>
+          <a:bodyPr anchor="t">
+            <a:normAutofit/>
+          </a:bodyPr>
           <a:lstStyle>
-            <a:lvl1pPr marL="0" indent="0" algn="ctr">
-              <a:buNone/>
-              <a:defRPr sz="2400"/>
+            <a:lvl1pPr marL="0" indent="0" algn="l">
+              <a:buNone/>
+              <a:defRPr sz="2200" cap="none" spc="0" baseline="0">
+                <a:solidFill>
+                  <a:schemeClr val="accent1">
+                    <a:lumMod val="20000"/>
+                    <a:lumOff val="80000"/>
+                  </a:schemeClr>
+                </a:solidFill>
+              </a:defRPr>
             </a:lvl1pPr>
             <a:lvl2pPr marL="457200" indent="0" algn="ctr">
               <a:buNone/>
-              <a:defRPr sz="2000"/>
+              <a:defRPr sz="2200"/>
             </a:lvl2pPr>
             <a:lvl3pPr marL="914400" indent="0" algn="ctr">
               <a:buNone/>
-              <a:defRPr sz="1800"/>
+              <a:defRPr sz="2200"/>
             </a:lvl3pPr>
             <a:lvl4pPr marL="1371600" indent="0" algn="ctr">
               <a:buNone/>
-              <a:defRPr sz="1600"/>
+              <a:defRPr sz="2000"/>
             </a:lvl4pPr>
             <a:lvl5pPr marL="1828800" indent="0" algn="ctr">
               <a:buNone/>
-              <a:defRPr sz="1600"/>
+              <a:defRPr sz="2000"/>
             </a:lvl5pPr>
             <a:lvl6pPr marL="2286000" indent="0" algn="ctr">
               <a:buNone/>
-              <a:defRPr sz="1600"/>
+              <a:defRPr sz="2000"/>
             </a:lvl6pPr>
             <a:lvl7pPr marL="2743200" indent="0" algn="ctr">
               <a:buNone/>
-              <a:defRPr sz="1600"/>
+              <a:defRPr sz="2000"/>
             </a:lvl7pPr>
             <a:lvl8pPr marL="3200400" indent="0" algn="ctr">
               <a:buNone/>
-              <a:defRPr sz="1600"/>
+              <a:defRPr sz="2000"/>
             </a:lvl8pPr>
             <a:lvl9pPr marL="3657600" indent="0" algn="ctr">
               <a:buNone/>
-              <a:defRPr sz="1600"/>
+              <a:defRPr sz="2000"/>
             </a:lvl9pPr>
           </a:lstStyle>
           <a:p>
@@ -222,13 +322,13 @@
               <a:rPr lang="he-IL" smtClean="0"/>
               <a:t>לחץ כדי לערוך סגנון כותרת משנה של תבנית בסיס</a:t>
             </a:r>
-            <a:endParaRPr lang="he-IL"/>
-          </a:p>
-        </p:txBody>
-      </p:sp>
-      <p:sp>
-        <p:nvSpPr>
-          <p:cNvPr id="4" name="מציין מיקום של תאריך 3"/>
+            <a:endParaRPr lang="en-US" dirty="0"/>
+          </a:p>
+        </p:txBody>
+      </p:sp>
+      <p:sp>
+        <p:nvSpPr>
+          <p:cNvPr id="4" name="Date Placeholder 3"/>
           <p:cNvSpPr>
             <a:spLocks noGrp="1"/>
           </p:cNvSpPr>
@@ -243,7 +343,7 @@
           <a:p>
             <a:fld id="{5C1F1556-5952-407C-A8BB-974DD1CBF695}" type="datetimeFigureOut">
               <a:rPr lang="he-IL" smtClean="0"/>
-              <a:t>ד'/טבת/תשע"ח</a:t>
+              <a:t>ו'/טבת/תשע"ח</a:t>
             </a:fld>
             <a:endParaRPr lang="he-IL"/>
           </a:p>
@@ -251,7 +351,7 @@
       </p:sp>
       <p:sp>
         <p:nvSpPr>
-          <p:cNvPr id="5" name="מציין מיקום של כותרת תחתונה 4"/>
+          <p:cNvPr id="5" name="Footer Placeholder 4"/>
           <p:cNvSpPr>
             <a:spLocks noGrp="1"/>
           </p:cNvSpPr>
@@ -270,7 +370,7 @@
       </p:sp>
       <p:sp>
         <p:nvSpPr>
-          <p:cNvPr id="6" name="מציין מיקום של מספר שקופית 5"/>
+          <p:cNvPr id="6" name="Slide Number Placeholder 5"/>
           <p:cNvSpPr>
             <a:spLocks noGrp="1"/>
           </p:cNvSpPr>
@@ -294,7 +394,7 @@
     </p:spTree>
     <p:extLst>
       <p:ext uri="{BB962C8B-B14F-4D97-AF65-F5344CB8AC3E}">
-        <p14:creationId xmlns:p14="http://schemas.microsoft.com/office/powerpoint/2010/main" val="366365233"/>
+        <p14:creationId xmlns:p14="http://schemas.microsoft.com/office/powerpoint/2010/main" val="1362016383"/>
       </p:ext>
     </p:extLst>
   </p:cSld>
@@ -323,7 +423,7 @@
       </p:grpSpPr>
       <p:sp>
         <p:nvSpPr>
-          <p:cNvPr id="2" name="כותרת 1"/>
+          <p:cNvPr id="2" name="Title 1"/>
           <p:cNvSpPr>
             <a:spLocks noGrp="1"/>
           </p:cNvSpPr>
@@ -340,13 +440,13 @@
               <a:rPr lang="he-IL" smtClean="0"/>
               <a:t>לחץ כדי לערוך סגנון כותרת של תבנית בסיס</a:t>
             </a:r>
-            <a:endParaRPr lang="he-IL"/>
-          </a:p>
-        </p:txBody>
-      </p:sp>
-      <p:sp>
-        <p:nvSpPr>
-          <p:cNvPr id="3" name="מציין מיקום של טקסט אנכי 2"/>
+            <a:endParaRPr lang="en-US" dirty="0"/>
+          </a:p>
+        </p:txBody>
+      </p:sp>
+      <p:sp>
+        <p:nvSpPr>
+          <p:cNvPr id="3" name="Vertical Text Placeholder 2"/>
           <p:cNvSpPr>
             <a:spLocks noGrp="1"/>
           </p:cNvSpPr>
@@ -356,7 +456,7 @@
         </p:nvSpPr>
         <p:spPr/>
         <p:txBody>
-          <a:bodyPr vert="eaVert"/>
+          <a:bodyPr vert="eaVert" anchor="t"/>
           <a:lstStyle/>
           <a:p>
             <a:pPr lvl="0"/>
@@ -392,13 +492,13 @@
               <a:rPr lang="he-IL" smtClean="0"/>
               <a:t>רמה חמישית</a:t>
             </a:r>
-            <a:endParaRPr lang="he-IL"/>
-          </a:p>
-        </p:txBody>
-      </p:sp>
-      <p:sp>
-        <p:nvSpPr>
-          <p:cNvPr id="4" name="מציין מיקום של תאריך 3"/>
+            <a:endParaRPr lang="en-US" dirty="0"/>
+          </a:p>
+        </p:txBody>
+      </p:sp>
+      <p:sp>
+        <p:nvSpPr>
+          <p:cNvPr id="7" name="Date Placeholder 6"/>
           <p:cNvSpPr>
             <a:spLocks noGrp="1"/>
           </p:cNvSpPr>
@@ -413,7 +513,7 @@
           <a:p>
             <a:fld id="{5C1F1556-5952-407C-A8BB-974DD1CBF695}" type="datetimeFigureOut">
               <a:rPr lang="he-IL" smtClean="0"/>
-              <a:t>ד'/טבת/תשע"ח</a:t>
+              <a:t>ו'/טבת/תשע"ח</a:t>
             </a:fld>
             <a:endParaRPr lang="he-IL"/>
           </a:p>
@@ -421,7 +521,7 @@
       </p:sp>
       <p:sp>
         <p:nvSpPr>
-          <p:cNvPr id="5" name="מציין מיקום של כותרת תחתונה 4"/>
+          <p:cNvPr id="8" name="Footer Placeholder 7"/>
           <p:cNvSpPr>
             <a:spLocks noGrp="1"/>
           </p:cNvSpPr>
@@ -440,7 +540,7 @@
       </p:sp>
       <p:sp>
         <p:nvSpPr>
-          <p:cNvPr id="6" name="מציין מיקום של מספר שקופית 5"/>
+          <p:cNvPr id="9" name="Slide Number Placeholder 8"/>
           <p:cNvSpPr>
             <a:spLocks noGrp="1"/>
           </p:cNvSpPr>
@@ -464,7 +564,7 @@
     </p:spTree>
     <p:extLst>
       <p:ext uri="{BB962C8B-B14F-4D97-AF65-F5344CB8AC3E}">
-        <p14:creationId xmlns:p14="http://schemas.microsoft.com/office/powerpoint/2010/main" val="165420850"/>
+        <p14:creationId xmlns:p14="http://schemas.microsoft.com/office/powerpoint/2010/main" val="3590969536"/>
       </p:ext>
     </p:extLst>
   </p:cSld>
@@ -493,7 +593,7 @@
       </p:grpSpPr>
       <p:sp>
         <p:nvSpPr>
-          <p:cNvPr id="2" name="כותרת אנכית 1"/>
+          <p:cNvPr id="2" name="Vertical Title 1"/>
           <p:cNvSpPr>
             <a:spLocks noGrp="1"/>
           </p:cNvSpPr>
@@ -503,8 +603,8 @@
         </p:nvSpPr>
         <p:spPr>
           <a:xfrm>
-            <a:off x="8724900" y="365125"/>
-            <a:ext cx="2628900" cy="5811838"/>
+            <a:off x="381000" y="990600"/>
+            <a:ext cx="2819400" cy="4953000"/>
           </a:xfrm>
         </p:spPr>
         <p:txBody>
@@ -515,13 +615,13 @@
               <a:rPr lang="he-IL" smtClean="0"/>
               <a:t>לחץ כדי לערוך סגנון כותרת של תבנית בסיס</a:t>
             </a:r>
-            <a:endParaRPr lang="he-IL"/>
-          </a:p>
-        </p:txBody>
-      </p:sp>
-      <p:sp>
-        <p:nvSpPr>
-          <p:cNvPr id="3" name="מציין מיקום של טקסט אנכי 2"/>
+            <a:endParaRPr lang="en-US" dirty="0"/>
+          </a:p>
+        </p:txBody>
+      </p:sp>
+      <p:sp>
+        <p:nvSpPr>
+          <p:cNvPr id="3" name="Vertical Text Placeholder 2"/>
           <p:cNvSpPr>
             <a:spLocks noGrp="1"/>
           </p:cNvSpPr>
@@ -531,12 +631,12 @@
         </p:nvSpPr>
         <p:spPr>
           <a:xfrm>
-            <a:off x="838200" y="365125"/>
-            <a:ext cx="7734300" cy="5811838"/>
+            <a:off x="3867912" y="868680"/>
+            <a:ext cx="7315200" cy="5120640"/>
           </a:xfrm>
         </p:spPr>
         <p:txBody>
-          <a:bodyPr vert="eaVert"/>
+          <a:bodyPr vert="eaVert" anchor="t"/>
           <a:lstStyle/>
           <a:p>
             <a:pPr lvl="0"/>
@@ -572,13 +672,13 @@
               <a:rPr lang="he-IL" smtClean="0"/>
               <a:t>רמה חמישית</a:t>
             </a:r>
-            <a:endParaRPr lang="he-IL"/>
-          </a:p>
-        </p:txBody>
-      </p:sp>
-      <p:sp>
-        <p:nvSpPr>
-          <p:cNvPr id="4" name="מציין מיקום של תאריך 3"/>
+            <a:endParaRPr lang="en-US" dirty="0"/>
+          </a:p>
+        </p:txBody>
+      </p:sp>
+      <p:sp>
+        <p:nvSpPr>
+          <p:cNvPr id="7" name="Date Placeholder 6"/>
           <p:cNvSpPr>
             <a:spLocks noGrp="1"/>
           </p:cNvSpPr>
@@ -593,7 +693,7 @@
           <a:p>
             <a:fld id="{5C1F1556-5952-407C-A8BB-974DD1CBF695}" type="datetimeFigureOut">
               <a:rPr lang="he-IL" smtClean="0"/>
-              <a:t>ד'/טבת/תשע"ח</a:t>
+              <a:t>ו'/טבת/תשע"ח</a:t>
             </a:fld>
             <a:endParaRPr lang="he-IL"/>
           </a:p>
@@ -601,7 +701,7 @@
       </p:sp>
       <p:sp>
         <p:nvSpPr>
-          <p:cNvPr id="5" name="מציין מיקום של כותרת תחתונה 4"/>
+          <p:cNvPr id="8" name="Footer Placeholder 7"/>
           <p:cNvSpPr>
             <a:spLocks noGrp="1"/>
           </p:cNvSpPr>
@@ -620,7 +720,7 @@
       </p:sp>
       <p:sp>
         <p:nvSpPr>
-          <p:cNvPr id="6" name="מציין מיקום של מספר שקופית 5"/>
+          <p:cNvPr id="9" name="Slide Number Placeholder 8"/>
           <p:cNvSpPr>
             <a:spLocks noGrp="1"/>
           </p:cNvSpPr>
@@ -644,7 +744,7 @@
     </p:spTree>
     <p:extLst>
       <p:ext uri="{BB962C8B-B14F-4D97-AF65-F5344CB8AC3E}">
-        <p14:creationId xmlns:p14="http://schemas.microsoft.com/office/powerpoint/2010/main" val="275406255"/>
+        <p14:creationId xmlns:p14="http://schemas.microsoft.com/office/powerpoint/2010/main" val="2367778328"/>
       </p:ext>
     </p:extLst>
   </p:cSld>
@@ -673,7 +773,7 @@
       </p:grpSpPr>
       <p:sp>
         <p:nvSpPr>
-          <p:cNvPr id="2" name="כותרת 1"/>
+          <p:cNvPr id="2" name="Title 1"/>
           <p:cNvSpPr>
             <a:spLocks noGrp="1"/>
           </p:cNvSpPr>
@@ -690,13 +790,13 @@
               <a:rPr lang="he-IL" smtClean="0"/>
               <a:t>לחץ כדי לערוך סגנון כותרת של תבנית בסיס</a:t>
             </a:r>
-            <a:endParaRPr lang="he-IL"/>
-          </a:p>
-        </p:txBody>
-      </p:sp>
-      <p:sp>
-        <p:nvSpPr>
-          <p:cNvPr id="3" name="מציין מיקום תוכן 2"/>
+            <a:endParaRPr lang="en-US" dirty="0"/>
+          </a:p>
+        </p:txBody>
+      </p:sp>
+      <p:sp>
+        <p:nvSpPr>
+          <p:cNvPr id="3" name="Content Placeholder 2"/>
           <p:cNvSpPr>
             <a:spLocks noGrp="1"/>
           </p:cNvSpPr>
@@ -742,13 +842,13 @@
               <a:rPr lang="he-IL" smtClean="0"/>
               <a:t>רמה חמישית</a:t>
             </a:r>
-            <a:endParaRPr lang="he-IL"/>
-          </a:p>
-        </p:txBody>
-      </p:sp>
-      <p:sp>
-        <p:nvSpPr>
-          <p:cNvPr id="4" name="מציין מיקום של תאריך 3"/>
+            <a:endParaRPr lang="en-US" dirty="0"/>
+          </a:p>
+        </p:txBody>
+      </p:sp>
+      <p:sp>
+        <p:nvSpPr>
+          <p:cNvPr id="4" name="Date Placeholder 3"/>
           <p:cNvSpPr>
             <a:spLocks noGrp="1"/>
           </p:cNvSpPr>
@@ -763,7 +863,7 @@
           <a:p>
             <a:fld id="{5C1F1556-5952-407C-A8BB-974DD1CBF695}" type="datetimeFigureOut">
               <a:rPr lang="he-IL" smtClean="0"/>
-              <a:t>ד'/טבת/תשע"ח</a:t>
+              <a:t>ו'/טבת/תשע"ח</a:t>
             </a:fld>
             <a:endParaRPr lang="he-IL"/>
           </a:p>
@@ -771,7 +871,7 @@
       </p:sp>
       <p:sp>
         <p:nvSpPr>
-          <p:cNvPr id="5" name="מציין מיקום של כותרת תחתונה 4"/>
+          <p:cNvPr id="5" name="Footer Placeholder 4"/>
           <p:cNvSpPr>
             <a:spLocks noGrp="1"/>
           </p:cNvSpPr>
@@ -790,7 +890,7 @@
       </p:sp>
       <p:sp>
         <p:nvSpPr>
-          <p:cNvPr id="6" name="מציין מיקום של מספר שקופית 5"/>
+          <p:cNvPr id="6" name="Slide Number Placeholder 5"/>
           <p:cNvSpPr>
             <a:spLocks noGrp="1"/>
           </p:cNvSpPr>
@@ -814,7 +914,7 @@
     </p:spTree>
     <p:extLst>
       <p:ext uri="{BB962C8B-B14F-4D97-AF65-F5344CB8AC3E}">
-        <p14:creationId xmlns:p14="http://schemas.microsoft.com/office/powerpoint/2010/main" val="2493322622"/>
+        <p14:creationId xmlns:p14="http://schemas.microsoft.com/office/powerpoint/2010/main" val="1744287935"/>
       </p:ext>
     </p:extLst>
   </p:cSld>
@@ -843,7 +943,7 @@
       </p:grpSpPr>
       <p:sp>
         <p:nvSpPr>
-          <p:cNvPr id="2" name="כותרת 1"/>
+          <p:cNvPr id="2" name="Title 1"/>
           <p:cNvSpPr>
             <a:spLocks noGrp="1"/>
           </p:cNvSpPr>
@@ -853,15 +953,24 @@
         </p:nvSpPr>
         <p:spPr>
           <a:xfrm>
-            <a:off x="831850" y="1709738"/>
-            <a:ext cx="10515600" cy="2852737"/>
+            <a:off x="3867912" y="1298448"/>
+            <a:ext cx="7315200" cy="3255264"/>
           </a:xfrm>
         </p:spPr>
         <p:txBody>
-          <a:bodyPr anchor="b"/>
+          <a:bodyPr anchor="b">
+            <a:normAutofit/>
+          </a:bodyPr>
           <a:lstStyle>
             <a:lvl1pPr>
-              <a:defRPr sz="6000"/>
+              <a:defRPr sz="5900" b="0" spc="-100" baseline="0">
+                <a:solidFill>
+                  <a:schemeClr val="tx1">
+                    <a:lumMod val="65000"/>
+                    <a:lumOff val="35000"/>
+                  </a:schemeClr>
+                </a:solidFill>
+              </a:defRPr>
             </a:lvl1pPr>
           </a:lstStyle>
           <a:p>
@@ -869,13 +978,13 @@
               <a:rPr lang="he-IL" smtClean="0"/>
               <a:t>לחץ כדי לערוך סגנון כותרת של תבנית בסיס</a:t>
             </a:r>
-            <a:endParaRPr lang="he-IL"/>
-          </a:p>
-        </p:txBody>
-      </p:sp>
-      <p:sp>
-        <p:nvSpPr>
-          <p:cNvPr id="3" name="מציין מיקום טקסט 2"/>
+            <a:endParaRPr lang="en-US" dirty="0"/>
+          </a:p>
+        </p:txBody>
+      </p:sp>
+      <p:sp>
+        <p:nvSpPr>
+          <p:cNvPr id="3" name="Text Placeholder 2"/>
           <p:cNvSpPr>
             <a:spLocks noGrp="1"/>
           </p:cNvSpPr>
@@ -885,26 +994,29 @@
         </p:nvSpPr>
         <p:spPr>
           <a:xfrm>
-            <a:off x="831850" y="4589463"/>
-            <a:ext cx="10515600" cy="1500187"/>
+            <a:off x="3886200" y="4672584"/>
+            <a:ext cx="7315200" cy="914400"/>
           </a:xfrm>
         </p:spPr>
         <p:txBody>
-          <a:bodyPr/>
+          <a:bodyPr anchor="t">
+            <a:normAutofit/>
+          </a:bodyPr>
           <a:lstStyle>
             <a:lvl1pPr marL="0" indent="0">
               <a:buNone/>
-              <a:defRPr sz="2400">
+              <a:defRPr sz="2200" cap="none" spc="0" baseline="0">
                 <a:solidFill>
-                  <a:schemeClr val="tx1">
-                    <a:tint val="75000"/>
+                  <a:schemeClr val="bg2">
+                    <a:lumMod val="40000"/>
+                    <a:lumOff val="60000"/>
                   </a:schemeClr>
                 </a:solidFill>
               </a:defRPr>
             </a:lvl1pPr>
             <a:lvl2pPr marL="457200" indent="0">
               <a:buNone/>
-              <a:defRPr sz="2000">
+              <a:defRPr sz="1800">
                 <a:solidFill>
                   <a:schemeClr val="tx1">
                     <a:tint val="75000"/>
@@ -914,7 +1026,7 @@
             </a:lvl2pPr>
             <a:lvl3pPr marL="914400" indent="0">
               <a:buNone/>
-              <a:defRPr sz="1800">
+              <a:defRPr sz="1600">
                 <a:solidFill>
                   <a:schemeClr val="tx1">
                     <a:tint val="75000"/>
@@ -924,7 +1036,7 @@
             </a:lvl3pPr>
             <a:lvl4pPr marL="1371600" indent="0">
               <a:buNone/>
-              <a:defRPr sz="1600">
+              <a:defRPr sz="1400">
                 <a:solidFill>
                   <a:schemeClr val="tx1">
                     <a:tint val="75000"/>
@@ -934,7 +1046,7 @@
             </a:lvl4pPr>
             <a:lvl5pPr marL="1828800" indent="0">
               <a:buNone/>
-              <a:defRPr sz="1600">
+              <a:defRPr sz="1400">
                 <a:solidFill>
                   <a:schemeClr val="tx1">
                     <a:tint val="75000"/>
@@ -944,7 +1056,7 @@
             </a:lvl5pPr>
             <a:lvl6pPr marL="2286000" indent="0">
               <a:buNone/>
-              <a:defRPr sz="1600">
+              <a:defRPr sz="1400">
                 <a:solidFill>
                   <a:schemeClr val="tx1">
                     <a:tint val="75000"/>
@@ -954,7 +1066,7 @@
             </a:lvl6pPr>
             <a:lvl7pPr marL="2743200" indent="0">
               <a:buNone/>
-              <a:defRPr sz="1600">
+              <a:defRPr sz="1400">
                 <a:solidFill>
                   <a:schemeClr val="tx1">
                     <a:tint val="75000"/>
@@ -964,7 +1076,7 @@
             </a:lvl7pPr>
             <a:lvl8pPr marL="3200400" indent="0">
               <a:buNone/>
-              <a:defRPr sz="1600">
+              <a:defRPr sz="1400">
                 <a:solidFill>
                   <a:schemeClr val="tx1">
                     <a:tint val="75000"/>
@@ -974,7 +1086,7 @@
             </a:lvl8pPr>
             <a:lvl9pPr marL="3657600" indent="0">
               <a:buNone/>
-              <a:defRPr sz="1600">
+              <a:defRPr sz="1400">
                 <a:solidFill>
                   <a:schemeClr val="tx1">
                     <a:tint val="75000"/>
@@ -994,7 +1106,7 @@
       </p:sp>
       <p:sp>
         <p:nvSpPr>
-          <p:cNvPr id="4" name="מציין מיקום של תאריך 3"/>
+          <p:cNvPr id="4" name="Date Placeholder 3"/>
           <p:cNvSpPr>
             <a:spLocks noGrp="1"/>
           </p:cNvSpPr>
@@ -1009,7 +1121,7 @@
           <a:p>
             <a:fld id="{5C1F1556-5952-407C-A8BB-974DD1CBF695}" type="datetimeFigureOut">
               <a:rPr lang="he-IL" smtClean="0"/>
-              <a:t>ד'/טבת/תשע"ח</a:t>
+              <a:t>ו'/טבת/תשע"ח</a:t>
             </a:fld>
             <a:endParaRPr lang="he-IL"/>
           </a:p>
@@ -1017,7 +1129,7 @@
       </p:sp>
       <p:sp>
         <p:nvSpPr>
-          <p:cNvPr id="5" name="מציין מיקום של כותרת תחתונה 4"/>
+          <p:cNvPr id="5" name="Footer Placeholder 4"/>
           <p:cNvSpPr>
             <a:spLocks noGrp="1"/>
           </p:cNvSpPr>
@@ -1036,7 +1148,7 @@
       </p:sp>
       <p:sp>
         <p:nvSpPr>
-          <p:cNvPr id="6" name="מציין מיקום של מספר שקופית 5"/>
+          <p:cNvPr id="6" name="Slide Number Placeholder 5"/>
           <p:cNvSpPr>
             <a:spLocks noGrp="1"/>
           </p:cNvSpPr>
@@ -1060,7 +1172,7 @@
     </p:spTree>
     <p:extLst>
       <p:ext uri="{BB962C8B-B14F-4D97-AF65-F5344CB8AC3E}">
-        <p14:creationId xmlns:p14="http://schemas.microsoft.com/office/powerpoint/2010/main" val="147512076"/>
+        <p14:creationId xmlns:p14="http://schemas.microsoft.com/office/powerpoint/2010/main" val="1284579612"/>
       </p:ext>
     </p:extLst>
   </p:cSld>
@@ -1089,7 +1201,7 @@
       </p:grpSpPr>
       <p:sp>
         <p:nvSpPr>
-          <p:cNvPr id="2" name="כותרת 1"/>
+          <p:cNvPr id="2" name="Title 1"/>
           <p:cNvSpPr>
             <a:spLocks noGrp="1"/>
           </p:cNvSpPr>
@@ -1106,13 +1218,13 @@
               <a:rPr lang="he-IL" smtClean="0"/>
               <a:t>לחץ כדי לערוך סגנון כותרת של תבנית בסיס</a:t>
             </a:r>
-            <a:endParaRPr lang="he-IL"/>
-          </a:p>
-        </p:txBody>
-      </p:sp>
-      <p:sp>
-        <p:nvSpPr>
-          <p:cNvPr id="3" name="מציין מיקום תוכן 2"/>
+            <a:endParaRPr lang="en-US" dirty="0"/>
+          </a:p>
+        </p:txBody>
+      </p:sp>
+      <p:sp>
+        <p:nvSpPr>
+          <p:cNvPr id="3" name="Content Placeholder 2"/>
           <p:cNvSpPr>
             <a:spLocks noGrp="1"/>
           </p:cNvSpPr>
@@ -1122,13 +1234,41 @@
         </p:nvSpPr>
         <p:spPr>
           <a:xfrm>
-            <a:off x="838200" y="1825625"/>
-            <a:ext cx="5181600" cy="4351338"/>
+            <a:off x="3867912" y="868680"/>
+            <a:ext cx="3474720" cy="5120640"/>
           </a:xfrm>
         </p:spPr>
         <p:txBody>
           <a:bodyPr/>
-          <a:lstStyle/>
+          <a:lstStyle>
+            <a:lvl1pPr>
+              <a:defRPr sz="2000"/>
+            </a:lvl1pPr>
+            <a:lvl2pPr>
+              <a:defRPr sz="1800"/>
+            </a:lvl2pPr>
+            <a:lvl3pPr>
+              <a:defRPr sz="1600"/>
+            </a:lvl3pPr>
+            <a:lvl4pPr>
+              <a:defRPr sz="1400"/>
+            </a:lvl4pPr>
+            <a:lvl5pPr>
+              <a:defRPr sz="1400"/>
+            </a:lvl5pPr>
+            <a:lvl6pPr>
+              <a:defRPr sz="1400"/>
+            </a:lvl6pPr>
+            <a:lvl7pPr>
+              <a:defRPr sz="1400"/>
+            </a:lvl7pPr>
+            <a:lvl8pPr>
+              <a:defRPr sz="1400"/>
+            </a:lvl8pPr>
+            <a:lvl9pPr>
+              <a:defRPr sz="1400"/>
+            </a:lvl9pPr>
+          </a:lstStyle>
           <a:p>
             <a:pPr lvl="0"/>
             <a:r>
@@ -1163,13 +1303,13 @@
               <a:rPr lang="he-IL" smtClean="0"/>
               <a:t>רמה חמישית</a:t>
             </a:r>
-            <a:endParaRPr lang="he-IL"/>
-          </a:p>
-        </p:txBody>
-      </p:sp>
-      <p:sp>
-        <p:nvSpPr>
-          <p:cNvPr id="4" name="מציין מיקום תוכן 3"/>
+            <a:endParaRPr lang="en-US" dirty="0"/>
+          </a:p>
+        </p:txBody>
+      </p:sp>
+      <p:sp>
+        <p:nvSpPr>
+          <p:cNvPr id="4" name="Content Placeholder 3"/>
           <p:cNvSpPr>
             <a:spLocks noGrp="1"/>
           </p:cNvSpPr>
@@ -1179,13 +1319,41 @@
         </p:nvSpPr>
         <p:spPr>
           <a:xfrm>
-            <a:off x="6172200" y="1825625"/>
-            <a:ext cx="5181600" cy="4351338"/>
+            <a:off x="7818120" y="868680"/>
+            <a:ext cx="3474720" cy="5120640"/>
           </a:xfrm>
         </p:spPr>
         <p:txBody>
           <a:bodyPr/>
-          <a:lstStyle/>
+          <a:lstStyle>
+            <a:lvl1pPr>
+              <a:defRPr sz="2000"/>
+            </a:lvl1pPr>
+            <a:lvl2pPr>
+              <a:defRPr sz="1800"/>
+            </a:lvl2pPr>
+            <a:lvl3pPr>
+              <a:defRPr sz="1600"/>
+            </a:lvl3pPr>
+            <a:lvl4pPr>
+              <a:defRPr sz="1400"/>
+            </a:lvl4pPr>
+            <a:lvl5pPr>
+              <a:defRPr sz="1400"/>
+            </a:lvl5pPr>
+            <a:lvl6pPr>
+              <a:defRPr sz="1400"/>
+            </a:lvl6pPr>
+            <a:lvl7pPr>
+              <a:defRPr sz="1400"/>
+            </a:lvl7pPr>
+            <a:lvl8pPr>
+              <a:defRPr sz="1400"/>
+            </a:lvl8pPr>
+            <a:lvl9pPr>
+              <a:defRPr sz="1400"/>
+            </a:lvl9pPr>
+          </a:lstStyle>
           <a:p>
             <a:pPr lvl="0"/>
             <a:r>
@@ -1220,13 +1388,13 @@
               <a:rPr lang="he-IL" smtClean="0"/>
               <a:t>רמה חמישית</a:t>
             </a:r>
-            <a:endParaRPr lang="he-IL"/>
-          </a:p>
-        </p:txBody>
-      </p:sp>
-      <p:sp>
-        <p:nvSpPr>
-          <p:cNvPr id="5" name="מציין מיקום של תאריך 4"/>
+            <a:endParaRPr lang="en-US" dirty="0"/>
+          </a:p>
+        </p:txBody>
+      </p:sp>
+      <p:sp>
+        <p:nvSpPr>
+          <p:cNvPr id="8" name="Date Placeholder 7"/>
           <p:cNvSpPr>
             <a:spLocks noGrp="1"/>
           </p:cNvSpPr>
@@ -1241,7 +1409,7 @@
           <a:p>
             <a:fld id="{5C1F1556-5952-407C-A8BB-974DD1CBF695}" type="datetimeFigureOut">
               <a:rPr lang="he-IL" smtClean="0"/>
-              <a:t>ד'/טבת/תשע"ח</a:t>
+              <a:t>ו'/טבת/תשע"ח</a:t>
             </a:fld>
             <a:endParaRPr lang="he-IL"/>
           </a:p>
@@ -1249,7 +1417,7 @@
       </p:sp>
       <p:sp>
         <p:nvSpPr>
-          <p:cNvPr id="6" name="מציין מיקום של כותרת תחתונה 5"/>
+          <p:cNvPr id="9" name="Footer Placeholder 8"/>
           <p:cNvSpPr>
             <a:spLocks noGrp="1"/>
           </p:cNvSpPr>
@@ -1268,7 +1436,7 @@
       </p:sp>
       <p:sp>
         <p:nvSpPr>
-          <p:cNvPr id="7" name="מציין מיקום של מספר שקופית 6"/>
+          <p:cNvPr id="10" name="Slide Number Placeholder 9"/>
           <p:cNvSpPr>
             <a:spLocks noGrp="1"/>
           </p:cNvSpPr>
@@ -1292,7 +1460,7 @@
     </p:spTree>
     <p:extLst>
       <p:ext uri="{BB962C8B-B14F-4D97-AF65-F5344CB8AC3E}">
-        <p14:creationId xmlns:p14="http://schemas.microsoft.com/office/powerpoint/2010/main" val="1616944328"/>
+        <p14:creationId xmlns:p14="http://schemas.microsoft.com/office/powerpoint/2010/main" val="3745166319"/>
       </p:ext>
     </p:extLst>
   </p:cSld>
@@ -1321,54 +1489,61 @@
       </p:grpSpPr>
       <p:sp>
         <p:nvSpPr>
-          <p:cNvPr id="2" name="כותרת 1"/>
+          <p:cNvPr id="10" name="Title 9"/>
           <p:cNvSpPr>
             <a:spLocks noGrp="1"/>
           </p:cNvSpPr>
           <p:nvPr>
             <p:ph type="title"/>
+          </p:nvPr>
+        </p:nvSpPr>
+        <p:spPr/>
+        <p:txBody>
+          <a:bodyPr/>
+          <a:lstStyle/>
+          <a:p>
+            <a:r>
+              <a:rPr lang="he-IL" smtClean="0"/>
+              <a:t>לחץ כדי לערוך סגנון כותרת של תבנית בסיס</a:t>
+            </a:r>
+            <a:endParaRPr lang="en-US" dirty="0"/>
+          </a:p>
+        </p:txBody>
+      </p:sp>
+      <p:sp>
+        <p:nvSpPr>
+          <p:cNvPr id="3" name="Text Placeholder 2"/>
+          <p:cNvSpPr>
+            <a:spLocks noGrp="1"/>
+          </p:cNvSpPr>
+          <p:nvPr>
+            <p:ph type="body" idx="1"/>
           </p:nvPr>
         </p:nvSpPr>
         <p:spPr>
           <a:xfrm>
-            <a:off x="839788" y="365125"/>
-            <a:ext cx="10515600" cy="1325563"/>
+            <a:off x="3867912" y="1023586"/>
+            <a:ext cx="3474720" cy="807720"/>
           </a:xfrm>
         </p:spPr>
         <p:txBody>
-          <a:bodyPr/>
-          <a:lstStyle/>
-          <a:p>
-            <a:r>
-              <a:rPr lang="he-IL" smtClean="0"/>
-              <a:t>לחץ כדי לערוך סגנון כותרת של תבנית בסיס</a:t>
-            </a:r>
-            <a:endParaRPr lang="he-IL"/>
-          </a:p>
-        </p:txBody>
-      </p:sp>
-      <p:sp>
-        <p:nvSpPr>
-          <p:cNvPr id="3" name="מציין מיקום טקסט 2"/>
-          <p:cNvSpPr>
-            <a:spLocks noGrp="1"/>
-          </p:cNvSpPr>
-          <p:nvPr>
-            <p:ph type="body" idx="1"/>
-          </p:nvPr>
-        </p:nvSpPr>
-        <p:spPr>
-          <a:xfrm>
-            <a:off x="839788" y="1681163"/>
-            <a:ext cx="5157787" cy="823912"/>
-          </a:xfrm>
-        </p:spPr>
-        <p:txBody>
-          <a:bodyPr anchor="b"/>
+          <a:bodyPr anchor="b">
+            <a:normAutofit/>
+          </a:bodyPr>
           <a:lstStyle>
             <a:lvl1pPr marL="0" indent="0">
-              <a:buNone/>
-              <a:defRPr sz="2400" b="1"/>
+              <a:spcBef>
+                <a:spcPts val="0"/>
+              </a:spcBef>
+              <a:buNone/>
+              <a:defRPr sz="2000" b="1">
+                <a:solidFill>
+                  <a:schemeClr val="bg2">
+                    <a:lumMod val="40000"/>
+                    <a:lumOff val="60000"/>
+                  </a:schemeClr>
+                </a:solidFill>
+              </a:defRPr>
             </a:lvl1pPr>
             <a:lvl2pPr marL="457200" indent="0">
               <a:buNone/>
@@ -1414,7 +1589,7 @@
       </p:sp>
       <p:sp>
         <p:nvSpPr>
-          <p:cNvPr id="4" name="מציין מיקום תוכן 3"/>
+          <p:cNvPr id="4" name="Content Placeholder 3"/>
           <p:cNvSpPr>
             <a:spLocks noGrp="1"/>
           </p:cNvSpPr>
@@ -1424,13 +1599,41 @@
         </p:nvSpPr>
         <p:spPr>
           <a:xfrm>
-            <a:off x="839788" y="2505075"/>
-            <a:ext cx="5157787" cy="3684588"/>
+            <a:off x="3867912" y="1930936"/>
+            <a:ext cx="3474720" cy="4023360"/>
           </a:xfrm>
         </p:spPr>
         <p:txBody>
           <a:bodyPr/>
-          <a:lstStyle/>
+          <a:lstStyle>
+            <a:lvl1pPr>
+              <a:defRPr sz="2000"/>
+            </a:lvl1pPr>
+            <a:lvl2pPr>
+              <a:defRPr sz="1800"/>
+            </a:lvl2pPr>
+            <a:lvl3pPr>
+              <a:defRPr sz="1600"/>
+            </a:lvl3pPr>
+            <a:lvl4pPr>
+              <a:defRPr sz="1400"/>
+            </a:lvl4pPr>
+            <a:lvl5pPr>
+              <a:defRPr sz="1400"/>
+            </a:lvl5pPr>
+            <a:lvl6pPr>
+              <a:defRPr sz="1400"/>
+            </a:lvl6pPr>
+            <a:lvl7pPr>
+              <a:defRPr sz="1400"/>
+            </a:lvl7pPr>
+            <a:lvl8pPr>
+              <a:defRPr sz="1400"/>
+            </a:lvl8pPr>
+            <a:lvl9pPr>
+              <a:defRPr sz="1400"/>
+            </a:lvl9pPr>
+          </a:lstStyle>
           <a:p>
             <a:pPr lvl="0"/>
             <a:r>
@@ -1465,13 +1668,13 @@
               <a:rPr lang="he-IL" smtClean="0"/>
               <a:t>רמה חמישית</a:t>
             </a:r>
-            <a:endParaRPr lang="he-IL"/>
-          </a:p>
-        </p:txBody>
-      </p:sp>
-      <p:sp>
-        <p:nvSpPr>
-          <p:cNvPr id="5" name="מציין מיקום טקסט 4"/>
+            <a:endParaRPr lang="en-US" dirty="0"/>
+          </a:p>
+        </p:txBody>
+      </p:sp>
+      <p:sp>
+        <p:nvSpPr>
+          <p:cNvPr id="5" name="Text Placeholder 4"/>
           <p:cNvSpPr>
             <a:spLocks noGrp="1"/>
           </p:cNvSpPr>
@@ -1481,16 +1684,28 @@
         </p:nvSpPr>
         <p:spPr>
           <a:xfrm>
-            <a:off x="6172200" y="1681163"/>
-            <a:ext cx="5183188" cy="823912"/>
+            <a:off x="7818463" y="1023586"/>
+            <a:ext cx="3474720" cy="813171"/>
           </a:xfrm>
         </p:spPr>
         <p:txBody>
-          <a:bodyPr anchor="b"/>
+          <a:bodyPr anchor="b">
+            <a:normAutofit/>
+          </a:bodyPr>
           <a:lstStyle>
             <a:lvl1pPr marL="0" indent="0">
-              <a:buNone/>
-              <a:defRPr sz="2400" b="1"/>
+              <a:spcBef>
+                <a:spcPts val="0"/>
+              </a:spcBef>
+              <a:buNone/>
+              <a:defRPr sz="2000" b="1">
+                <a:solidFill>
+                  <a:schemeClr val="bg2">
+                    <a:lumMod val="40000"/>
+                    <a:lumOff val="60000"/>
+                  </a:schemeClr>
+                </a:solidFill>
+              </a:defRPr>
             </a:lvl1pPr>
             <a:lvl2pPr marL="457200" indent="0">
               <a:buNone/>
@@ -1536,7 +1751,7 @@
       </p:sp>
       <p:sp>
         <p:nvSpPr>
-          <p:cNvPr id="6" name="מציין מיקום תוכן 5"/>
+          <p:cNvPr id="6" name="Content Placeholder 5"/>
           <p:cNvSpPr>
             <a:spLocks noGrp="1"/>
           </p:cNvSpPr>
@@ -1546,13 +1761,41 @@
         </p:nvSpPr>
         <p:spPr>
           <a:xfrm>
-            <a:off x="6172200" y="2505075"/>
-            <a:ext cx="5183188" cy="3684588"/>
+            <a:off x="7818463" y="1930936"/>
+            <a:ext cx="3474720" cy="4023360"/>
           </a:xfrm>
         </p:spPr>
         <p:txBody>
           <a:bodyPr/>
-          <a:lstStyle/>
+          <a:lstStyle>
+            <a:lvl1pPr>
+              <a:defRPr sz="2000"/>
+            </a:lvl1pPr>
+            <a:lvl2pPr>
+              <a:defRPr sz="1800"/>
+            </a:lvl2pPr>
+            <a:lvl3pPr>
+              <a:defRPr sz="1600"/>
+            </a:lvl3pPr>
+            <a:lvl4pPr>
+              <a:defRPr sz="1400"/>
+            </a:lvl4pPr>
+            <a:lvl5pPr>
+              <a:defRPr sz="1400"/>
+            </a:lvl5pPr>
+            <a:lvl6pPr>
+              <a:defRPr sz="1400"/>
+            </a:lvl6pPr>
+            <a:lvl7pPr>
+              <a:defRPr sz="1400"/>
+            </a:lvl7pPr>
+            <a:lvl8pPr>
+              <a:defRPr sz="1400"/>
+            </a:lvl8pPr>
+            <a:lvl9pPr>
+              <a:defRPr sz="1400"/>
+            </a:lvl9pPr>
+          </a:lstStyle>
           <a:p>
             <a:pPr lvl="0"/>
             <a:r>
@@ -1587,13 +1830,13 @@
               <a:rPr lang="he-IL" smtClean="0"/>
               <a:t>רמה חמישית</a:t>
             </a:r>
-            <a:endParaRPr lang="he-IL"/>
-          </a:p>
-        </p:txBody>
-      </p:sp>
-      <p:sp>
-        <p:nvSpPr>
-          <p:cNvPr id="7" name="מציין מיקום של תאריך 6"/>
+            <a:endParaRPr lang="en-US" dirty="0"/>
+          </a:p>
+        </p:txBody>
+      </p:sp>
+      <p:sp>
+        <p:nvSpPr>
+          <p:cNvPr id="2" name="Date Placeholder 1"/>
           <p:cNvSpPr>
             <a:spLocks noGrp="1"/>
           </p:cNvSpPr>
@@ -1608,7 +1851,7 @@
           <a:p>
             <a:fld id="{5C1F1556-5952-407C-A8BB-974DD1CBF695}" type="datetimeFigureOut">
               <a:rPr lang="he-IL" smtClean="0"/>
-              <a:t>ד'/טבת/תשע"ח</a:t>
+              <a:t>ו'/טבת/תשע"ח</a:t>
             </a:fld>
             <a:endParaRPr lang="he-IL"/>
           </a:p>
@@ -1616,7 +1859,7 @@
       </p:sp>
       <p:sp>
         <p:nvSpPr>
-          <p:cNvPr id="8" name="מציין מיקום של כותרת תחתונה 7"/>
+          <p:cNvPr id="11" name="Footer Placeholder 10"/>
           <p:cNvSpPr>
             <a:spLocks noGrp="1"/>
           </p:cNvSpPr>
@@ -1635,7 +1878,7 @@
       </p:sp>
       <p:sp>
         <p:nvSpPr>
-          <p:cNvPr id="9" name="מציין מיקום של מספר שקופית 8"/>
+          <p:cNvPr id="12" name="Slide Number Placeholder 11"/>
           <p:cNvSpPr>
             <a:spLocks noGrp="1"/>
           </p:cNvSpPr>
@@ -1659,7 +1902,7 @@
     </p:spTree>
     <p:extLst>
       <p:ext uri="{BB962C8B-B14F-4D97-AF65-F5344CB8AC3E}">
-        <p14:creationId xmlns:p14="http://schemas.microsoft.com/office/powerpoint/2010/main" val="3542571543"/>
+        <p14:creationId xmlns:p14="http://schemas.microsoft.com/office/powerpoint/2010/main" val="1699512129"/>
       </p:ext>
     </p:extLst>
   </p:cSld>
@@ -1688,7 +1931,7 @@
       </p:grpSpPr>
       <p:sp>
         <p:nvSpPr>
-          <p:cNvPr id="2" name="כותרת 1"/>
+          <p:cNvPr id="6" name="Title 5"/>
           <p:cNvSpPr>
             <a:spLocks noGrp="1"/>
           </p:cNvSpPr>
@@ -1705,13 +1948,13 @@
               <a:rPr lang="he-IL" smtClean="0"/>
               <a:t>לחץ כדי לערוך סגנון כותרת של תבנית בסיס</a:t>
             </a:r>
-            <a:endParaRPr lang="he-IL"/>
-          </a:p>
-        </p:txBody>
-      </p:sp>
-      <p:sp>
-        <p:nvSpPr>
-          <p:cNvPr id="3" name="מציין מיקום של תאריך 2"/>
+            <a:endParaRPr lang="en-US" dirty="0"/>
+          </a:p>
+        </p:txBody>
+      </p:sp>
+      <p:sp>
+        <p:nvSpPr>
+          <p:cNvPr id="2" name="Date Placeholder 1"/>
           <p:cNvSpPr>
             <a:spLocks noGrp="1"/>
           </p:cNvSpPr>
@@ -1726,7 +1969,7 @@
           <a:p>
             <a:fld id="{5C1F1556-5952-407C-A8BB-974DD1CBF695}" type="datetimeFigureOut">
               <a:rPr lang="he-IL" smtClean="0"/>
-              <a:t>ד'/טבת/תשע"ח</a:t>
+              <a:t>ו'/טבת/תשע"ח</a:t>
             </a:fld>
             <a:endParaRPr lang="he-IL"/>
           </a:p>
@@ -1734,7 +1977,7 @@
       </p:sp>
       <p:sp>
         <p:nvSpPr>
-          <p:cNvPr id="4" name="מציין מיקום של כותרת תחתונה 3"/>
+          <p:cNvPr id="7" name="Footer Placeholder 6"/>
           <p:cNvSpPr>
             <a:spLocks noGrp="1"/>
           </p:cNvSpPr>
@@ -1753,7 +1996,7 @@
       </p:sp>
       <p:sp>
         <p:nvSpPr>
-          <p:cNvPr id="5" name="מציין מיקום של מספר שקופית 4"/>
+          <p:cNvPr id="8" name="Slide Number Placeholder 7"/>
           <p:cNvSpPr>
             <a:spLocks noGrp="1"/>
           </p:cNvSpPr>
@@ -1777,7 +2020,7 @@
     </p:spTree>
     <p:extLst>
       <p:ext uri="{BB962C8B-B14F-4D97-AF65-F5344CB8AC3E}">
-        <p14:creationId xmlns:p14="http://schemas.microsoft.com/office/powerpoint/2010/main" val="2501236775"/>
+        <p14:creationId xmlns:p14="http://schemas.microsoft.com/office/powerpoint/2010/main" val="3297775611"/>
       </p:ext>
     </p:extLst>
   </p:cSld>
@@ -1788,7 +2031,7 @@
 </file>
 
 <file path=ppt/slideLayouts/slideLayout7.xml><?xml version="1.0" encoding="utf-8"?>
-<p:sldLayout xmlns:a="http://schemas.openxmlformats.org/drawingml/2006/main" xmlns:r="http://schemas.openxmlformats.org/officeDocument/2006/relationships" xmlns:p="http://schemas.openxmlformats.org/presentationml/2006/main" type="blank" preserve="1">
+<p:sldLayout xmlns:a="http://schemas.openxmlformats.org/drawingml/2006/main" xmlns:r="http://schemas.openxmlformats.org/officeDocument/2006/relationships" xmlns:p="http://schemas.openxmlformats.org/presentationml/2006/main" showMasterSp="0" type="blank" preserve="1">
   <p:cSld name="ריק">
     <p:spTree>
       <p:nvGrpSpPr>
@@ -1806,7 +2049,7 @@
       </p:grpSpPr>
       <p:sp>
         <p:nvSpPr>
-          <p:cNvPr id="2" name="מציין מיקום של תאריך 1"/>
+          <p:cNvPr id="5" name="Date Placeholder 4"/>
           <p:cNvSpPr>
             <a:spLocks noGrp="1"/>
           </p:cNvSpPr>
@@ -1821,7 +2064,7 @@
           <a:p>
             <a:fld id="{5C1F1556-5952-407C-A8BB-974DD1CBF695}" type="datetimeFigureOut">
               <a:rPr lang="he-IL" smtClean="0"/>
-              <a:t>ד'/טבת/תשע"ח</a:t>
+              <a:t>ו'/טבת/תשע"ח</a:t>
             </a:fld>
             <a:endParaRPr lang="he-IL"/>
           </a:p>
@@ -1829,7 +2072,7 @@
       </p:sp>
       <p:sp>
         <p:nvSpPr>
-          <p:cNvPr id="3" name="מציין מיקום של כותרת תחתונה 2"/>
+          <p:cNvPr id="6" name="Footer Placeholder 5"/>
           <p:cNvSpPr>
             <a:spLocks noGrp="1"/>
           </p:cNvSpPr>
@@ -1848,7 +2091,7 @@
       </p:sp>
       <p:sp>
         <p:nvSpPr>
-          <p:cNvPr id="4" name="מציין מיקום של מספר שקופית 3"/>
+          <p:cNvPr id="7" name="Slide Number Placeholder 6"/>
           <p:cNvSpPr>
             <a:spLocks noGrp="1"/>
           </p:cNvSpPr>
@@ -1872,7 +2115,7 @@
     </p:spTree>
     <p:extLst>
       <p:ext uri="{BB962C8B-B14F-4D97-AF65-F5344CB8AC3E}">
-        <p14:creationId xmlns:p14="http://schemas.microsoft.com/office/powerpoint/2010/main" val="1903303982"/>
+        <p14:creationId xmlns:p14="http://schemas.microsoft.com/office/powerpoint/2010/main" val="4181607462"/>
       </p:ext>
     </p:extLst>
   </p:cSld>
@@ -1901,7 +2144,7 @@
       </p:grpSpPr>
       <p:sp>
         <p:nvSpPr>
-          <p:cNvPr id="2" name="כותרת 1"/>
+          <p:cNvPr id="2" name="Title 1"/>
           <p:cNvSpPr>
             <a:spLocks noGrp="1"/>
           </p:cNvSpPr>
@@ -1911,15 +2154,17 @@
         </p:nvSpPr>
         <p:spPr>
           <a:xfrm>
-            <a:off x="839788" y="457200"/>
-            <a:ext cx="3932237" cy="1600200"/>
+            <a:off x="256032" y="1143000"/>
+            <a:ext cx="2834640" cy="2377440"/>
           </a:xfrm>
         </p:spPr>
         <p:txBody>
-          <a:bodyPr anchor="b"/>
+          <a:bodyPr anchor="b">
+            <a:normAutofit/>
+          </a:bodyPr>
           <a:lstStyle>
             <a:lvl1pPr>
-              <a:defRPr sz="3200"/>
+              <a:defRPr sz="3200" b="0" baseline="0"/>
             </a:lvl1pPr>
           </a:lstStyle>
           <a:p>
@@ -1927,13 +2172,13 @@
               <a:rPr lang="he-IL" smtClean="0"/>
               <a:t>לחץ כדי לערוך סגנון כותרת של תבנית בסיס</a:t>
             </a:r>
-            <a:endParaRPr lang="he-IL"/>
-          </a:p>
-        </p:txBody>
-      </p:sp>
-      <p:sp>
-        <p:nvSpPr>
-          <p:cNvPr id="3" name="מציין מיקום תוכן 2"/>
+            <a:endParaRPr lang="en-US" dirty="0"/>
+          </a:p>
+        </p:txBody>
+      </p:sp>
+      <p:sp>
+        <p:nvSpPr>
+          <p:cNvPr id="3" name="Content Placeholder 2"/>
           <p:cNvSpPr>
             <a:spLocks noGrp="1"/>
           </p:cNvSpPr>
@@ -1943,39 +2188,39 @@
         </p:nvSpPr>
         <p:spPr>
           <a:xfrm>
-            <a:off x="5183188" y="987425"/>
-            <a:ext cx="6172200" cy="4873625"/>
+            <a:off x="3867912" y="868680"/>
+            <a:ext cx="7315200" cy="5120640"/>
           </a:xfrm>
         </p:spPr>
         <p:txBody>
           <a:bodyPr/>
           <a:lstStyle>
             <a:lvl1pPr>
-              <a:defRPr sz="3200"/>
+              <a:defRPr sz="2000"/>
             </a:lvl1pPr>
             <a:lvl2pPr>
-              <a:defRPr sz="2800"/>
+              <a:defRPr sz="1800"/>
             </a:lvl2pPr>
             <a:lvl3pPr>
-              <a:defRPr sz="2400"/>
+              <a:defRPr sz="1600"/>
             </a:lvl3pPr>
             <a:lvl4pPr>
-              <a:defRPr sz="2000"/>
+              <a:defRPr sz="1400"/>
             </a:lvl4pPr>
             <a:lvl5pPr>
-              <a:defRPr sz="2000"/>
+              <a:defRPr sz="1400"/>
             </a:lvl5pPr>
             <a:lvl6pPr>
-              <a:defRPr sz="2000"/>
+              <a:defRPr sz="1400"/>
             </a:lvl6pPr>
             <a:lvl7pPr>
-              <a:defRPr sz="2000"/>
+              <a:defRPr sz="1400"/>
             </a:lvl7pPr>
             <a:lvl8pPr>
-              <a:defRPr sz="2000"/>
+              <a:defRPr sz="1400"/>
             </a:lvl8pPr>
             <a:lvl9pPr>
-              <a:defRPr sz="2000"/>
+              <a:defRPr sz="1400"/>
             </a:lvl9pPr>
           </a:lstStyle>
           <a:p>
@@ -2012,13 +2257,13 @@
               <a:rPr lang="he-IL" smtClean="0"/>
               <a:t>רמה חמישית</a:t>
             </a:r>
-            <a:endParaRPr lang="he-IL"/>
-          </a:p>
-        </p:txBody>
-      </p:sp>
-      <p:sp>
-        <p:nvSpPr>
-          <p:cNvPr id="4" name="מציין מיקום טקסט 3"/>
+            <a:endParaRPr lang="en-US" dirty="0"/>
+          </a:p>
+        </p:txBody>
+      </p:sp>
+      <p:sp>
+        <p:nvSpPr>
+          <p:cNvPr id="4" name="Text Placeholder 3"/>
           <p:cNvSpPr>
             <a:spLocks noGrp="1"/>
           </p:cNvSpPr>
@@ -2028,48 +2273,57 @@
         </p:nvSpPr>
         <p:spPr>
           <a:xfrm>
-            <a:off x="839788" y="2057400"/>
-            <a:ext cx="3932237" cy="3811588"/>
+            <a:off x="256032" y="3494176"/>
+            <a:ext cx="2834640" cy="2321990"/>
           </a:xfrm>
         </p:spPr>
         <p:txBody>
-          <a:bodyPr/>
+          <a:bodyPr anchor="t">
+            <a:normAutofit/>
+          </a:bodyPr>
           <a:lstStyle>
             <a:lvl1pPr marL="0" indent="0">
-              <a:buNone/>
-              <a:defRPr sz="1600"/>
+              <a:lnSpc>
+                <a:spcPct val="100000"/>
+              </a:lnSpc>
+              <a:buNone/>
+              <a:defRPr sz="1400">
+                <a:solidFill>
+                  <a:srgbClr val="FFFFFF"/>
+                </a:solidFill>
+              </a:defRPr>
             </a:lvl1pPr>
             <a:lvl2pPr marL="457200" indent="0">
               <a:buNone/>
-              <a:defRPr sz="1400"/>
+              <a:defRPr sz="1200"/>
             </a:lvl2pPr>
             <a:lvl3pPr marL="914400" indent="0">
               <a:buNone/>
-              <a:defRPr sz="1200"/>
+              <a:defRPr sz="1000"/>
             </a:lvl3pPr>
             <a:lvl4pPr marL="1371600" indent="0">
               <a:buNone/>
-              <a:defRPr sz="1000"/>
+              <a:defRPr sz="900"/>
             </a:lvl4pPr>
             <a:lvl5pPr marL="1828800" indent="0">
               <a:buNone/>
-              <a:defRPr sz="1000"/>
+              <a:defRPr sz="900"/>
             </a:lvl5pPr>
             <a:lvl6pPr marL="2286000" indent="0">
               <a:buNone/>
-              <a:defRPr sz="1000"/>
+              <a:defRPr sz="900"/>
             </a:lvl6pPr>
             <a:lvl7pPr marL="2743200" indent="0">
               <a:buNone/>
-              <a:defRPr sz="1000"/>
+              <a:defRPr sz="900"/>
             </a:lvl7pPr>
             <a:lvl8pPr marL="3200400" indent="0">
               <a:buNone/>
-              <a:defRPr sz="1000"/>
+              <a:defRPr sz="900"/>
             </a:lvl8pPr>
             <a:lvl9pPr marL="3657600" indent="0">
               <a:buNone/>
-              <a:defRPr sz="1000"/>
+              <a:defRPr sz="900"/>
             </a:lvl9pPr>
           </a:lstStyle>
           <a:p>
@@ -2083,7 +2337,7 @@
       </p:sp>
       <p:sp>
         <p:nvSpPr>
-          <p:cNvPr id="5" name="מציין מיקום של תאריך 4"/>
+          <p:cNvPr id="8" name="Date Placeholder 7"/>
           <p:cNvSpPr>
             <a:spLocks noGrp="1"/>
           </p:cNvSpPr>
@@ -2098,7 +2352,7 @@
           <a:p>
             <a:fld id="{5C1F1556-5952-407C-A8BB-974DD1CBF695}" type="datetimeFigureOut">
               <a:rPr lang="he-IL" smtClean="0"/>
-              <a:t>ד'/טבת/תשע"ח</a:t>
+              <a:t>ו'/טבת/תשע"ח</a:t>
             </a:fld>
             <a:endParaRPr lang="he-IL"/>
           </a:p>
@@ -2106,7 +2360,7 @@
       </p:sp>
       <p:sp>
         <p:nvSpPr>
-          <p:cNvPr id="6" name="מציין מיקום של כותרת תחתונה 5"/>
+          <p:cNvPr id="9" name="Footer Placeholder 8"/>
           <p:cNvSpPr>
             <a:spLocks noGrp="1"/>
           </p:cNvSpPr>
@@ -2125,7 +2379,7 @@
       </p:sp>
       <p:sp>
         <p:nvSpPr>
-          <p:cNvPr id="7" name="מציין מיקום של מספר שקופית 6"/>
+          <p:cNvPr id="10" name="Slide Number Placeholder 9"/>
           <p:cNvSpPr>
             <a:spLocks noGrp="1"/>
           </p:cNvSpPr>
@@ -2149,7 +2403,7 @@
     </p:spTree>
     <p:extLst>
       <p:ext uri="{BB962C8B-B14F-4D97-AF65-F5344CB8AC3E}">
-        <p14:creationId xmlns:p14="http://schemas.microsoft.com/office/powerpoint/2010/main" val="2532230402"/>
+        <p14:creationId xmlns:p14="http://schemas.microsoft.com/office/powerpoint/2010/main" val="3941462644"/>
       </p:ext>
     </p:extLst>
   </p:cSld>
@@ -2178,7 +2432,7 @@
       </p:grpSpPr>
       <p:sp>
         <p:nvSpPr>
-          <p:cNvPr id="2" name="כותרת 1"/>
+          <p:cNvPr id="2" name="Title 1"/>
           <p:cNvSpPr>
             <a:spLocks noGrp="1"/>
           </p:cNvSpPr>
@@ -2188,15 +2442,17 @@
         </p:nvSpPr>
         <p:spPr>
           <a:xfrm>
-            <a:off x="839788" y="457200"/>
-            <a:ext cx="3932237" cy="1600200"/>
+            <a:off x="256032" y="1143000"/>
+            <a:ext cx="2834640" cy="2377440"/>
           </a:xfrm>
         </p:spPr>
         <p:txBody>
-          <a:bodyPr anchor="b"/>
+          <a:bodyPr anchor="b">
+            <a:normAutofit/>
+          </a:bodyPr>
           <a:lstStyle>
             <a:lvl1pPr>
-              <a:defRPr sz="3200"/>
+              <a:defRPr sz="3200" b="0"/>
             </a:lvl1pPr>
           </a:lstStyle>
           <a:p>
@@ -2204,15 +2460,15 @@
               <a:rPr lang="he-IL" smtClean="0"/>
               <a:t>לחץ כדי לערוך סגנון כותרת של תבנית בסיס</a:t>
             </a:r>
-            <a:endParaRPr lang="he-IL"/>
-          </a:p>
-        </p:txBody>
-      </p:sp>
-      <p:sp>
-        <p:nvSpPr>
-          <p:cNvPr id="3" name="מציין מיקום של תמונה 2"/>
-          <p:cNvSpPr>
-            <a:spLocks noGrp="1"/>
+            <a:endParaRPr lang="en-US" dirty="0"/>
+          </a:p>
+        </p:txBody>
+      </p:sp>
+      <p:sp>
+        <p:nvSpPr>
+          <p:cNvPr id="3" name="Picture Placeholder 2"/>
+          <p:cNvSpPr>
+            <a:spLocks noGrp="1" noChangeAspect="1"/>
           </p:cNvSpPr>
           <p:nvPr>
             <p:ph type="pic" idx="1"/>
@@ -2220,12 +2476,18 @@
         </p:nvSpPr>
         <p:spPr>
           <a:xfrm>
-            <a:off x="5183188" y="987425"/>
-            <a:ext cx="6172200" cy="4873625"/>
+            <a:off x="3570644" y="767419"/>
+            <a:ext cx="8115230" cy="5330952"/>
           </a:xfrm>
+          <a:solidFill>
+            <a:schemeClr val="bg1">
+              <a:lumMod val="50000"/>
+              <a:lumOff val="50000"/>
+            </a:schemeClr>
+          </a:solidFill>
         </p:spPr>
         <p:txBody>
-          <a:bodyPr/>
+          <a:bodyPr anchor="t"/>
           <a:lstStyle>
             <a:lvl1pPr marL="0" indent="0">
               <a:buNone/>
@@ -2265,13 +2527,17 @@
             </a:lvl9pPr>
           </a:lstStyle>
           <a:p>
-            <a:endParaRPr lang="he-IL"/>
-          </a:p>
-        </p:txBody>
-      </p:sp>
-      <p:sp>
-        <p:nvSpPr>
-          <p:cNvPr id="4" name="מציין מיקום טקסט 3"/>
+            <a:r>
+              <a:rPr lang="he-IL" smtClean="0"/>
+              <a:t>לחץ על הסמל כדי להוסיף תמונה</a:t>
+            </a:r>
+            <a:endParaRPr lang="en-US" dirty="0"/>
+          </a:p>
+        </p:txBody>
+      </p:sp>
+      <p:sp>
+        <p:nvSpPr>
+          <p:cNvPr id="4" name="Text Placeholder 3"/>
           <p:cNvSpPr>
             <a:spLocks noGrp="1"/>
           </p:cNvSpPr>
@@ -2281,48 +2547,57 @@
         </p:nvSpPr>
         <p:spPr>
           <a:xfrm>
-            <a:off x="839788" y="2057400"/>
-            <a:ext cx="3932237" cy="3811588"/>
+            <a:off x="256032" y="3493008"/>
+            <a:ext cx="2834640" cy="2322576"/>
           </a:xfrm>
         </p:spPr>
         <p:txBody>
-          <a:bodyPr/>
+          <a:bodyPr anchor="t">
+            <a:normAutofit/>
+          </a:bodyPr>
           <a:lstStyle>
             <a:lvl1pPr marL="0" indent="0">
-              <a:buNone/>
-              <a:defRPr sz="1600"/>
+              <a:lnSpc>
+                <a:spcPct val="100000"/>
+              </a:lnSpc>
+              <a:buNone/>
+              <a:defRPr sz="1400">
+                <a:solidFill>
+                  <a:srgbClr val="FFFFFF"/>
+                </a:solidFill>
+              </a:defRPr>
             </a:lvl1pPr>
             <a:lvl2pPr marL="457200" indent="0">
               <a:buNone/>
-              <a:defRPr sz="1400"/>
+              <a:defRPr sz="1200"/>
             </a:lvl2pPr>
             <a:lvl3pPr marL="914400" indent="0">
               <a:buNone/>
-              <a:defRPr sz="1200"/>
+              <a:defRPr sz="1000"/>
             </a:lvl3pPr>
             <a:lvl4pPr marL="1371600" indent="0">
               <a:buNone/>
-              <a:defRPr sz="1000"/>
+              <a:defRPr sz="900"/>
             </a:lvl4pPr>
             <a:lvl5pPr marL="1828800" indent="0">
               <a:buNone/>
-              <a:defRPr sz="1000"/>
+              <a:defRPr sz="900"/>
             </a:lvl5pPr>
             <a:lvl6pPr marL="2286000" indent="0">
               <a:buNone/>
-              <a:defRPr sz="1000"/>
+              <a:defRPr sz="900"/>
             </a:lvl6pPr>
             <a:lvl7pPr marL="2743200" indent="0">
               <a:buNone/>
-              <a:defRPr sz="1000"/>
+              <a:defRPr sz="900"/>
             </a:lvl7pPr>
             <a:lvl8pPr marL="3200400" indent="0">
               <a:buNone/>
-              <a:defRPr sz="1000"/>
+              <a:defRPr sz="900"/>
             </a:lvl8pPr>
             <a:lvl9pPr marL="3657600" indent="0">
               <a:buNone/>
-              <a:defRPr sz="1000"/>
+              <a:defRPr sz="900"/>
             </a:lvl9pPr>
           </a:lstStyle>
           <a:p>
@@ -2336,7 +2611,7 @@
       </p:sp>
       <p:sp>
         <p:nvSpPr>
-          <p:cNvPr id="5" name="מציין מיקום של תאריך 4"/>
+          <p:cNvPr id="8" name="Date Placeholder 7"/>
           <p:cNvSpPr>
             <a:spLocks noGrp="1"/>
           </p:cNvSpPr>
@@ -2351,7 +2626,7 @@
           <a:p>
             <a:fld id="{5C1F1556-5952-407C-A8BB-974DD1CBF695}" type="datetimeFigureOut">
               <a:rPr lang="he-IL" smtClean="0"/>
-              <a:t>ד'/טבת/תשע"ח</a:t>
+              <a:t>ו'/טבת/תשע"ח</a:t>
             </a:fld>
             <a:endParaRPr lang="he-IL"/>
           </a:p>
@@ -2359,7 +2634,7 @@
       </p:sp>
       <p:sp>
         <p:nvSpPr>
-          <p:cNvPr id="6" name="מציין מיקום של כותרת תחתונה 5"/>
+          <p:cNvPr id="9" name="Footer Placeholder 8"/>
           <p:cNvSpPr>
             <a:spLocks noGrp="1"/>
           </p:cNvSpPr>
@@ -2367,7 +2642,12 @@
             <p:ph type="ftr" sz="quarter" idx="11"/>
           </p:nvPr>
         </p:nvSpPr>
-        <p:spPr/>
+        <p:spPr>
+          <a:xfrm>
+            <a:off x="3499101" y="6356350"/>
+            <a:ext cx="5911517" cy="365125"/>
+          </a:xfrm>
+        </p:spPr>
         <p:txBody>
           <a:bodyPr/>
           <a:lstStyle/>
@@ -2378,7 +2658,7 @@
       </p:sp>
       <p:sp>
         <p:nvSpPr>
-          <p:cNvPr id="7" name="מציין מיקום של מספר שקופית 6"/>
+          <p:cNvPr id="10" name="Slide Number Placeholder 9"/>
           <p:cNvSpPr>
             <a:spLocks noGrp="1"/>
           </p:cNvSpPr>
@@ -2402,7 +2682,7 @@
     </p:spTree>
     <p:extLst>
       <p:ext uri="{BB962C8B-B14F-4D97-AF65-F5344CB8AC3E}">
-        <p14:creationId xmlns:p14="http://schemas.microsoft.com/office/powerpoint/2010/main" val="1442922214"/>
+        <p14:creationId xmlns:p14="http://schemas.microsoft.com/office/powerpoint/2010/main" val="3079544605"/>
       </p:ext>
     </p:extLst>
   </p:cSld>
@@ -2417,7 +2697,7 @@
   <p:cSld>
     <p:bg>
       <p:bgRef idx="1001">
-        <a:schemeClr val="bg1"/>
+        <a:schemeClr val="bg2"/>
       </p:bgRef>
     </p:bg>
     <p:spTree>
@@ -2436,25 +2716,65 @@
       </p:grpSpPr>
       <p:sp>
         <p:nvSpPr>
-          <p:cNvPr id="2" name="מציין מיקום של כותרת 1"/>
-          <p:cNvSpPr>
-            <a:spLocks noGrp="1"/>
-          </p:cNvSpPr>
-          <p:nvPr>
-            <p:ph type="title"/>
-          </p:nvPr>
+          <p:cNvPr id="7" name="Rectangle 6"/>
+          <p:cNvSpPr/>
+          <p:nvPr/>
         </p:nvSpPr>
         <p:spPr>
           <a:xfrm>
-            <a:off x="838200" y="365125"/>
-            <a:ext cx="10515600" cy="1325563"/>
+            <a:off x="1" y="758952"/>
+            <a:ext cx="3443590" cy="5330952"/>
+          </a:xfrm>
+          <a:prstGeom prst="rect">
+            <a:avLst/>
+          </a:prstGeom>
+          <a:solidFill>
+            <a:schemeClr val="accent1">
+              <a:alpha val="95000"/>
+            </a:schemeClr>
+          </a:solidFill>
+          <a:ln>
+            <a:noFill/>
+          </a:ln>
+        </p:spPr>
+        <p:style>
+          <a:lnRef idx="2">
+            <a:schemeClr val="accent1">
+              <a:shade val="50000"/>
+            </a:schemeClr>
+          </a:lnRef>
+          <a:fillRef idx="1">
+            <a:schemeClr val="accent1"/>
+          </a:fillRef>
+          <a:effectRef idx="0">
+            <a:schemeClr val="accent1"/>
+          </a:effectRef>
+          <a:fontRef idx="minor">
+            <a:schemeClr val="lt1"/>
+          </a:fontRef>
+        </p:style>
+      </p:sp>
+      <p:sp>
+        <p:nvSpPr>
+          <p:cNvPr id="2" name="Title Placeholder 1"/>
+          <p:cNvSpPr>
+            <a:spLocks noGrp="1"/>
+          </p:cNvSpPr>
+          <p:nvPr>
+            <p:ph type="title"/>
+          </p:nvPr>
+        </p:nvSpPr>
+        <p:spPr>
+          <a:xfrm>
+            <a:off x="252919" y="1123837"/>
+            <a:ext cx="2947482" cy="4601183"/>
           </a:xfrm>
           <a:prstGeom prst="rect">
             <a:avLst/>
           </a:prstGeom>
         </p:spPr>
         <p:txBody>
-          <a:bodyPr vert="horz" lIns="91440" tIns="45720" rIns="91440" bIns="45720" rtlCol="1" anchor="ctr">
+          <a:bodyPr vert="horz" lIns="91440" tIns="45720" rIns="91440" bIns="45720" rtlCol="0" anchor="ctr">
             <a:normAutofit/>
           </a:bodyPr>
           <a:lstStyle/>
@@ -2463,31 +2783,71 @@
               <a:rPr lang="he-IL" smtClean="0"/>
               <a:t>לחץ כדי לערוך סגנון כותרת של תבנית בסיס</a:t>
             </a:r>
-            <a:endParaRPr lang="he-IL"/>
-          </a:p>
-        </p:txBody>
-      </p:sp>
-      <p:sp>
-        <p:nvSpPr>
-          <p:cNvPr id="3" name="מציין מיקום טקסט 2"/>
-          <p:cNvSpPr>
-            <a:spLocks noGrp="1"/>
-          </p:cNvSpPr>
-          <p:nvPr>
-            <p:ph type="body" idx="1"/>
-          </p:nvPr>
+            <a:endParaRPr lang="en-US" dirty="0"/>
+          </a:p>
+        </p:txBody>
+      </p:sp>
+      <p:sp>
+        <p:nvSpPr>
+          <p:cNvPr id="38" name="Rectangle 37"/>
+          <p:cNvSpPr/>
+          <p:nvPr/>
         </p:nvSpPr>
         <p:spPr>
           <a:xfrm>
-            <a:off x="838200" y="1825625"/>
-            <a:ext cx="10515600" cy="4351338"/>
+            <a:off x="11815864" y="758952"/>
+            <a:ext cx="384048" cy="5330952"/>
+          </a:xfrm>
+          <a:prstGeom prst="rect">
+            <a:avLst/>
+          </a:prstGeom>
+          <a:solidFill>
+            <a:schemeClr val="accent1">
+              <a:alpha val="40000"/>
+            </a:schemeClr>
+          </a:solidFill>
+          <a:ln>
+            <a:noFill/>
+          </a:ln>
+        </p:spPr>
+        <p:style>
+          <a:lnRef idx="2">
+            <a:schemeClr val="accent1">
+              <a:shade val="50000"/>
+            </a:schemeClr>
+          </a:lnRef>
+          <a:fillRef idx="1">
+            <a:schemeClr val="accent1"/>
+          </a:fillRef>
+          <a:effectRef idx="0">
+            <a:schemeClr val="accent1"/>
+          </a:effectRef>
+          <a:fontRef idx="minor">
+            <a:schemeClr val="lt1"/>
+          </a:fontRef>
+        </p:style>
+      </p:sp>
+      <p:sp>
+        <p:nvSpPr>
+          <p:cNvPr id="3" name="Text Placeholder 2"/>
+          <p:cNvSpPr>
+            <a:spLocks noGrp="1"/>
+          </p:cNvSpPr>
+          <p:nvPr>
+            <p:ph type="body" idx="1"/>
+          </p:nvPr>
+        </p:nvSpPr>
+        <p:spPr>
+          <a:xfrm>
+            <a:off x="3869268" y="864108"/>
+            <a:ext cx="7315200" cy="5120640"/>
           </a:xfrm>
           <a:prstGeom prst="rect">
             <a:avLst/>
           </a:prstGeom>
         </p:spPr>
         <p:txBody>
-          <a:bodyPr vert="horz" lIns="91440" tIns="45720" rIns="91440" bIns="45720" rtlCol="1">
+          <a:bodyPr vert="horz" lIns="91440" tIns="45720" rIns="91440" bIns="45720" rtlCol="0" anchor="ctr">
             <a:normAutofit/>
           </a:bodyPr>
           <a:lstStyle/>
@@ -2525,13 +2885,13 @@
               <a:rPr lang="he-IL" smtClean="0"/>
               <a:t>רמה חמישית</a:t>
             </a:r>
-            <a:endParaRPr lang="he-IL"/>
-          </a:p>
-        </p:txBody>
-      </p:sp>
-      <p:sp>
-        <p:nvSpPr>
-          <p:cNvPr id="4" name="מציין מיקום של תאריך 3"/>
+            <a:endParaRPr lang="en-US" dirty="0"/>
+          </a:p>
+        </p:txBody>
+      </p:sp>
+      <p:sp>
+        <p:nvSpPr>
+          <p:cNvPr id="4" name="Date Placeholder 3"/>
           <p:cNvSpPr>
             <a:spLocks noGrp="1"/>
           </p:cNvSpPr>
@@ -2541,7 +2901,7 @@
         </p:nvSpPr>
         <p:spPr>
           <a:xfrm>
-            <a:off x="8610600" y="6356350"/>
+            <a:off x="262465" y="6356350"/>
             <a:ext cx="2743200" cy="365125"/>
           </a:xfrm>
           <a:prstGeom prst="rect">
@@ -2549,13 +2909,14 @@
           </a:prstGeom>
         </p:spPr>
         <p:txBody>
-          <a:bodyPr vert="horz" lIns="91440" tIns="45720" rIns="91440" bIns="45720" rtlCol="1" anchor="ctr"/>
+          <a:bodyPr vert="horz" lIns="91440" tIns="45720" rIns="91440" bIns="45720" rtlCol="0" anchor="ctr"/>
           <a:lstStyle>
-            <a:lvl1pPr algn="r">
-              <a:defRPr sz="1200">
+            <a:lvl1pPr algn="l">
+              <a:defRPr sz="1100">
                 <a:solidFill>
-                  <a:schemeClr val="tx1">
-                    <a:tint val="75000"/>
+                  <a:schemeClr val="bg2">
+                    <a:lumMod val="40000"/>
+                    <a:lumOff val="60000"/>
                   </a:schemeClr>
                 </a:solidFill>
               </a:defRPr>
@@ -2564,7 +2925,7 @@
           <a:p>
             <a:fld id="{5C1F1556-5952-407C-A8BB-974DD1CBF695}" type="datetimeFigureOut">
               <a:rPr lang="he-IL" smtClean="0"/>
-              <a:t>ד'/טבת/תשע"ח</a:t>
+              <a:t>ו'/טבת/תשע"ח</a:t>
             </a:fld>
             <a:endParaRPr lang="he-IL"/>
           </a:p>
@@ -2572,7 +2933,7 @@
       </p:sp>
       <p:sp>
         <p:nvSpPr>
-          <p:cNvPr id="5" name="מציין מיקום של כותרת תחתונה 4"/>
+          <p:cNvPr id="5" name="Footer Placeholder 4"/>
           <p:cNvSpPr>
             <a:spLocks noGrp="1"/>
           </p:cNvSpPr>
@@ -2582,21 +2943,22 @@
         </p:nvSpPr>
         <p:spPr>
           <a:xfrm>
-            <a:off x="4038600" y="6356350"/>
-            <a:ext cx="4114800" cy="365125"/>
+            <a:off x="3869268" y="6356350"/>
+            <a:ext cx="5911517" cy="365125"/>
           </a:xfrm>
           <a:prstGeom prst="rect">
             <a:avLst/>
           </a:prstGeom>
         </p:spPr>
         <p:txBody>
-          <a:bodyPr vert="horz" lIns="91440" tIns="45720" rIns="91440" bIns="45720" rtlCol="1" anchor="ctr"/>
+          <a:bodyPr vert="horz" lIns="91440" tIns="45720" rIns="91440" bIns="45720" rtlCol="0" anchor="ctr"/>
           <a:lstStyle>
-            <a:lvl1pPr algn="ctr">
-              <a:defRPr sz="1200">
+            <a:lvl1pPr algn="l">
+              <a:defRPr sz="1100">
                 <a:solidFill>
-                  <a:schemeClr val="tx1">
-                    <a:tint val="75000"/>
+                  <a:schemeClr val="bg2">
+                    <a:lumMod val="40000"/>
+                    <a:lumOff val="60000"/>
                   </a:schemeClr>
                 </a:solidFill>
               </a:defRPr>
@@ -2609,7 +2971,7 @@
       </p:sp>
       <p:sp>
         <p:nvSpPr>
-          <p:cNvPr id="6" name="מציין מיקום של מספר שקופית 5"/>
+          <p:cNvPr id="6" name="Slide Number Placeholder 5"/>
           <p:cNvSpPr>
             <a:spLocks noGrp="1"/>
           </p:cNvSpPr>
@@ -2619,22 +2981,20 @@
         </p:nvSpPr>
         <p:spPr>
           <a:xfrm>
-            <a:off x="838200" y="6356350"/>
-            <a:ext cx="2743200" cy="365125"/>
+            <a:off x="10634135" y="6356350"/>
+            <a:ext cx="1530927" cy="365125"/>
           </a:xfrm>
           <a:prstGeom prst="rect">
             <a:avLst/>
           </a:prstGeom>
         </p:spPr>
         <p:txBody>
-          <a:bodyPr vert="horz" lIns="91440" tIns="45720" rIns="91440" bIns="45720" rtlCol="1" anchor="ctr"/>
+          <a:bodyPr vert="horz" lIns="91440" tIns="45720" rIns="91440" bIns="45720" rtlCol="0" anchor="ctr"/>
           <a:lstStyle>
-            <a:lvl1pPr algn="l">
-              <a:defRPr sz="1200">
+            <a:lvl1pPr algn="r">
+              <a:defRPr sz="1200" b="1">
                 <a:solidFill>
-                  <a:schemeClr val="tx1">
-                    <a:tint val="75000"/>
-                  </a:schemeClr>
+                  <a:schemeClr val="accent1"/>
                 </a:solidFill>
               </a:defRPr>
             </a:lvl1pPr>
@@ -2651,27 +3011,27 @@
     </p:spTree>
     <p:extLst>
       <p:ext uri="{BB962C8B-B14F-4D97-AF65-F5344CB8AC3E}">
-        <p14:creationId xmlns:p14="http://schemas.microsoft.com/office/powerpoint/2010/main" val="4045397408"/>
+        <p14:creationId xmlns:p14="http://schemas.microsoft.com/office/powerpoint/2010/main" val="903867753"/>
       </p:ext>
     </p:extLst>
   </p:cSld>
-  <p:clrMap bg1="lt1" tx1="dk1" bg2="lt2" tx2="dk2" accent1="accent1" accent2="accent2" accent3="accent3" accent4="accent4" accent5="accent5" accent6="accent6" hlink="hlink" folHlink="folHlink"/>
+  <p:clrMap bg1="dk1" tx1="lt1" bg2="dk2" tx2="lt2" accent1="accent1" accent2="accent2" accent3="accent3" accent4="accent4" accent5="accent5" accent6="accent6" hlink="hlink" folHlink="folHlink"/>
   <p:sldLayoutIdLst>
-    <p:sldLayoutId id="2147483649" r:id="rId1"/>
-    <p:sldLayoutId id="2147483650" r:id="rId2"/>
-    <p:sldLayoutId id="2147483651" r:id="rId3"/>
-    <p:sldLayoutId id="2147483652" r:id="rId4"/>
-    <p:sldLayoutId id="2147483653" r:id="rId5"/>
-    <p:sldLayoutId id="2147483654" r:id="rId6"/>
-    <p:sldLayoutId id="2147483655" r:id="rId7"/>
-    <p:sldLayoutId id="2147483656" r:id="rId8"/>
-    <p:sldLayoutId id="2147483657" r:id="rId9"/>
-    <p:sldLayoutId id="2147483658" r:id="rId10"/>
-    <p:sldLayoutId id="2147483659" r:id="rId11"/>
+    <p:sldLayoutId id="2147483721" r:id="rId1"/>
+    <p:sldLayoutId id="2147483722" r:id="rId2"/>
+    <p:sldLayoutId id="2147483723" r:id="rId3"/>
+    <p:sldLayoutId id="2147483724" r:id="rId4"/>
+    <p:sldLayoutId id="2147483725" r:id="rId5"/>
+    <p:sldLayoutId id="2147483726" r:id="rId6"/>
+    <p:sldLayoutId id="2147483727" r:id="rId7"/>
+    <p:sldLayoutId id="2147483728" r:id="rId8"/>
+    <p:sldLayoutId id="2147483729" r:id="rId9"/>
+    <p:sldLayoutId id="2147483730" r:id="rId10"/>
+    <p:sldLayoutId id="2147483731" r:id="rId11"/>
   </p:sldLayoutIdLst>
   <p:txStyles>
     <p:titleStyle>
-      <a:lvl1pPr algn="r" defTabSz="914400" rtl="1" eaLnBrk="1" latinLnBrk="0" hangingPunct="1">
+      <a:lvl1pPr algn="l" defTabSz="914400" rtl="1" eaLnBrk="1" latinLnBrk="0" hangingPunct="1">
         <a:lnSpc>
           <a:spcPct val="90000"/>
         </a:lnSpc>
@@ -2679,9 +3039,9 @@
           <a:spcPct val="0"/>
         </a:spcBef>
         <a:buNone/>
-        <a:defRPr sz="4400" kern="1200">
+        <a:defRPr sz="3600" kern="1200" spc="-60" baseline="0">
           <a:solidFill>
-            <a:schemeClr val="tx1"/>
+            <a:srgbClr val="FFFFFF"/>
           </a:solidFill>
           <a:latin typeface="+mj-lt"/>
           <a:ea typeface="+mj-ea"/>
@@ -2690,90 +3050,147 @@
       </a:lvl1pPr>
     </p:titleStyle>
     <p:bodyStyle>
-      <a:lvl1pPr marL="228600" indent="-228600" algn="r" defTabSz="914400" rtl="1" eaLnBrk="1" latinLnBrk="0" hangingPunct="1">
+      <a:lvl1pPr marL="182880" indent="-182880" algn="r" defTabSz="914400" rtl="1" eaLnBrk="1" latinLnBrk="0" hangingPunct="1">
         <a:lnSpc>
           <a:spcPct val="90000"/>
         </a:lnSpc>
         <a:spcBef>
-          <a:spcPts val="1000"/>
+          <a:spcPts val="1200"/>
         </a:spcBef>
-        <a:buFont typeface="Arial" panose="020B0604020202020204" pitchFamily="34" charset="0"/>
-        <a:buChar char="•"/>
-        <a:defRPr sz="2800" kern="1200">
+        <a:buClr>
+          <a:schemeClr val="accent1"/>
+        </a:buClr>
+        <a:buFont typeface="Wingdings 2" pitchFamily="18" charset="2"/>
+        <a:buChar char=""/>
+        <a:tabLst>
+          <a:tab pos="1143000" algn="l"/>
+        </a:tabLst>
+        <a:defRPr sz="2000" kern="1200">
           <a:solidFill>
-            <a:schemeClr val="tx1"/>
+            <a:schemeClr val="bg2">
+              <a:lumMod val="20000"/>
+              <a:lumOff val="80000"/>
+            </a:schemeClr>
           </a:solidFill>
           <a:latin typeface="+mn-lt"/>
           <a:ea typeface="+mn-ea"/>
           <a:cs typeface="+mn-cs"/>
         </a:defRPr>
       </a:lvl1pPr>
-      <a:lvl2pPr marL="685800" indent="-228600" algn="r" defTabSz="914400" rtl="1" eaLnBrk="1" latinLnBrk="0" hangingPunct="1">
+      <a:lvl2pPr marL="685800" indent="-182880" algn="r" defTabSz="914400" rtl="1" eaLnBrk="1" latinLnBrk="0" hangingPunct="1">
         <a:lnSpc>
           <a:spcPct val="90000"/>
         </a:lnSpc>
         <a:spcBef>
-          <a:spcPts val="500"/>
+          <a:spcPts val="250"/>
         </a:spcBef>
-        <a:buFont typeface="Arial" panose="020B0604020202020204" pitchFamily="34" charset="0"/>
-        <a:buChar char="•"/>
-        <a:defRPr sz="2400" kern="1200">
+        <a:spcAft>
+          <a:spcPts val="250"/>
+        </a:spcAft>
+        <a:buClr>
+          <a:schemeClr val="accent1"/>
+        </a:buClr>
+        <a:buFont typeface="Wingdings 2" pitchFamily="18" charset="2"/>
+        <a:buChar char=""/>
+        <a:tabLst>
+          <a:tab pos="1143000" algn="l"/>
+        </a:tabLst>
+        <a:defRPr sz="1800" kern="1200">
           <a:solidFill>
-            <a:schemeClr val="tx1"/>
+            <a:schemeClr val="bg2">
+              <a:lumMod val="20000"/>
+              <a:lumOff val="80000"/>
+            </a:schemeClr>
           </a:solidFill>
           <a:latin typeface="+mn-lt"/>
           <a:ea typeface="+mn-ea"/>
           <a:cs typeface="+mn-cs"/>
         </a:defRPr>
       </a:lvl2pPr>
-      <a:lvl3pPr marL="1143000" indent="-228600" algn="r" defTabSz="914400" rtl="1" eaLnBrk="1" latinLnBrk="0" hangingPunct="1">
+      <a:lvl3pPr marL="1143000" indent="-182880" algn="r" defTabSz="914400" rtl="1" eaLnBrk="1" latinLnBrk="0" hangingPunct="1">
         <a:lnSpc>
           <a:spcPct val="90000"/>
         </a:lnSpc>
         <a:spcBef>
-          <a:spcPts val="500"/>
+          <a:spcPts val="250"/>
         </a:spcBef>
-        <a:buFont typeface="Arial" panose="020B0604020202020204" pitchFamily="34" charset="0"/>
-        <a:buChar char="•"/>
-        <a:defRPr sz="2000" kern="1200">
+        <a:spcAft>
+          <a:spcPts val="250"/>
+        </a:spcAft>
+        <a:buClr>
+          <a:schemeClr val="accent1"/>
+        </a:buClr>
+        <a:buFont typeface="Wingdings 2" pitchFamily="18" charset="2"/>
+        <a:buChar char=""/>
+        <a:tabLst>
+          <a:tab pos="1143000" algn="l"/>
+        </a:tabLst>
+        <a:defRPr sz="1600" kern="1200">
           <a:solidFill>
-            <a:schemeClr val="tx1"/>
+            <a:schemeClr val="bg2">
+              <a:lumMod val="20000"/>
+              <a:lumOff val="80000"/>
+            </a:schemeClr>
           </a:solidFill>
           <a:latin typeface="+mn-lt"/>
           <a:ea typeface="+mn-ea"/>
           <a:cs typeface="+mn-cs"/>
         </a:defRPr>
       </a:lvl3pPr>
-      <a:lvl4pPr marL="1600200" indent="-228600" algn="r" defTabSz="914400" rtl="1" eaLnBrk="1" latinLnBrk="0" hangingPunct="1">
+      <a:lvl4pPr marL="1600200" indent="-182880" algn="r" defTabSz="914400" rtl="1" eaLnBrk="1" latinLnBrk="0" hangingPunct="1">
         <a:lnSpc>
           <a:spcPct val="90000"/>
         </a:lnSpc>
         <a:spcBef>
-          <a:spcPts val="500"/>
+          <a:spcPts val="250"/>
         </a:spcBef>
-        <a:buFont typeface="Arial" panose="020B0604020202020204" pitchFamily="34" charset="0"/>
-        <a:buChar char="•"/>
-        <a:defRPr sz="1800" kern="1200">
+        <a:spcAft>
+          <a:spcPts val="250"/>
+        </a:spcAft>
+        <a:buClr>
+          <a:schemeClr val="accent1"/>
+        </a:buClr>
+        <a:buFont typeface="Wingdings 2" pitchFamily="18" charset="2"/>
+        <a:buChar char=""/>
+        <a:tabLst>
+          <a:tab pos="1143000" algn="l"/>
+        </a:tabLst>
+        <a:defRPr sz="1400" kern="1200">
           <a:solidFill>
-            <a:schemeClr val="tx1"/>
+            <a:schemeClr val="bg2">
+              <a:lumMod val="20000"/>
+              <a:lumOff val="80000"/>
+            </a:schemeClr>
           </a:solidFill>
           <a:latin typeface="+mn-lt"/>
           <a:ea typeface="+mn-ea"/>
           <a:cs typeface="+mn-cs"/>
         </a:defRPr>
       </a:lvl4pPr>
-      <a:lvl5pPr marL="2057400" indent="-228600" algn="r" defTabSz="914400" rtl="1" eaLnBrk="1" latinLnBrk="0" hangingPunct="1">
+      <a:lvl5pPr marL="2057400" indent="-182880" algn="r" defTabSz="914400" rtl="1" eaLnBrk="1" latinLnBrk="0" hangingPunct="1">
         <a:lnSpc>
           <a:spcPct val="90000"/>
         </a:lnSpc>
         <a:spcBef>
-          <a:spcPts val="500"/>
+          <a:spcPts val="250"/>
         </a:spcBef>
-        <a:buFont typeface="Arial" panose="020B0604020202020204" pitchFamily="34" charset="0"/>
-        <a:buChar char="•"/>
-        <a:defRPr sz="1800" kern="1200">
+        <a:spcAft>
+          <a:spcPts val="250"/>
+        </a:spcAft>
+        <a:buClr>
+          <a:schemeClr val="accent1"/>
+        </a:buClr>
+        <a:buFont typeface="Wingdings 2" pitchFamily="18" charset="2"/>
+        <a:buChar char=""/>
+        <a:tabLst>
+          <a:tab pos="1143000" algn="l"/>
+        </a:tabLst>
+        <a:defRPr sz="1400" kern="1200">
           <a:solidFill>
-            <a:schemeClr val="tx1"/>
+            <a:schemeClr val="bg2">
+              <a:lumMod val="20000"/>
+              <a:lumOff val="80000"/>
+            </a:schemeClr>
           </a:solidFill>
           <a:latin typeface="+mn-lt"/>
           <a:ea typeface="+mn-ea"/>
@@ -2785,13 +3202,25 @@
           <a:spcPct val="90000"/>
         </a:lnSpc>
         <a:spcBef>
-          <a:spcPts val="500"/>
+          <a:spcPts val="250"/>
         </a:spcBef>
-        <a:buFont typeface="Arial" panose="020B0604020202020204" pitchFamily="34" charset="0"/>
-        <a:buChar char="•"/>
-        <a:defRPr sz="1800" kern="1200">
+        <a:spcAft>
+          <a:spcPts val="250"/>
+        </a:spcAft>
+        <a:buClr>
+          <a:schemeClr val="accent1"/>
+        </a:buClr>
+        <a:buFont typeface="Wingdings 2" pitchFamily="18" charset="2"/>
+        <a:buChar char=""/>
+        <a:tabLst>
+          <a:tab pos="1143000" algn="l"/>
+        </a:tabLst>
+        <a:defRPr sz="1400" kern="1200">
           <a:solidFill>
-            <a:schemeClr val="tx1"/>
+            <a:schemeClr val="bg2">
+              <a:lumMod val="20000"/>
+              <a:lumOff val="80000"/>
+            </a:schemeClr>
           </a:solidFill>
           <a:latin typeface="+mn-lt"/>
           <a:ea typeface="+mn-ea"/>
@@ -2803,13 +3232,25 @@
           <a:spcPct val="90000"/>
         </a:lnSpc>
         <a:spcBef>
-          <a:spcPts val="500"/>
+          <a:spcPts val="250"/>
         </a:spcBef>
-        <a:buFont typeface="Arial" panose="020B0604020202020204" pitchFamily="34" charset="0"/>
-        <a:buChar char="•"/>
-        <a:defRPr sz="1800" kern="1200">
+        <a:spcAft>
+          <a:spcPts val="250"/>
+        </a:spcAft>
+        <a:buClr>
+          <a:schemeClr val="accent1"/>
+        </a:buClr>
+        <a:buFont typeface="Wingdings 2" pitchFamily="18" charset="2"/>
+        <a:buChar char=""/>
+        <a:tabLst>
+          <a:tab pos="1143000" algn="l"/>
+        </a:tabLst>
+        <a:defRPr sz="1400" kern="1200">
           <a:solidFill>
-            <a:schemeClr val="tx1"/>
+            <a:schemeClr val="bg2">
+              <a:lumMod val="20000"/>
+              <a:lumOff val="80000"/>
+            </a:schemeClr>
           </a:solidFill>
           <a:latin typeface="+mn-lt"/>
           <a:ea typeface="+mn-ea"/>
@@ -2821,13 +3262,25 @@
           <a:spcPct val="90000"/>
         </a:lnSpc>
         <a:spcBef>
-          <a:spcPts val="500"/>
+          <a:spcPts val="250"/>
         </a:spcBef>
-        <a:buFont typeface="Arial" panose="020B0604020202020204" pitchFamily="34" charset="0"/>
-        <a:buChar char="•"/>
-        <a:defRPr sz="1800" kern="1200">
+        <a:spcAft>
+          <a:spcPts val="250"/>
+        </a:spcAft>
+        <a:buClr>
+          <a:schemeClr val="accent1"/>
+        </a:buClr>
+        <a:buFont typeface="Wingdings 2" pitchFamily="18" charset="2"/>
+        <a:buChar char=""/>
+        <a:tabLst>
+          <a:tab pos="1143000" algn="l"/>
+        </a:tabLst>
+        <a:defRPr sz="1400" kern="1200">
           <a:solidFill>
-            <a:schemeClr val="tx1"/>
+            <a:schemeClr val="bg2">
+              <a:lumMod val="20000"/>
+              <a:lumOff val="80000"/>
+            </a:schemeClr>
           </a:solidFill>
           <a:latin typeface="+mn-lt"/>
           <a:ea typeface="+mn-ea"/>
@@ -2839,13 +3292,25 @@
           <a:spcPct val="90000"/>
         </a:lnSpc>
         <a:spcBef>
-          <a:spcPts val="500"/>
+          <a:spcPts val="250"/>
         </a:spcBef>
-        <a:buFont typeface="Arial" panose="020B0604020202020204" pitchFamily="34" charset="0"/>
-        <a:buChar char="•"/>
-        <a:defRPr sz="1800" kern="1200">
+        <a:spcAft>
+          <a:spcPts val="250"/>
+        </a:spcAft>
+        <a:buClr>
+          <a:schemeClr val="accent1"/>
+        </a:buClr>
+        <a:buFont typeface="Wingdings 2" pitchFamily="18" charset="2"/>
+        <a:buChar char=""/>
+        <a:tabLst>
+          <a:tab pos="1143000" algn="l"/>
+        </a:tabLst>
+        <a:defRPr sz="1400" kern="1200">
           <a:solidFill>
-            <a:schemeClr val="tx1"/>
+            <a:schemeClr val="bg2">
+              <a:lumMod val="20000"/>
+              <a:lumOff val="80000"/>
+            </a:schemeClr>
           </a:solidFill>
           <a:latin typeface="+mn-lt"/>
           <a:ea typeface="+mn-ea"/>
@@ -2855,7 +3320,7 @@
     </p:bodyStyle>
     <p:otherStyle>
       <a:defPPr>
-        <a:defRPr lang="he-IL"/>
+        <a:defRPr lang="en-US"/>
       </a:defPPr>
       <a:lvl1pPr marL="0" algn="r" defTabSz="914400" rtl="1" eaLnBrk="1" latinLnBrk="0" hangingPunct="1">
         <a:defRPr sz="1800" kern="1200">
@@ -3029,6 +3494,13 @@
   <p:clrMapOvr>
     <a:masterClrMapping/>
   </p:clrMapOvr>
+  <p:timing>
+    <p:tnLst>
+      <p:par>
+        <p:cTn id="1" dur="indefinite" restart="never" nodeType="tmRoot"/>
+      </p:par>
+    </p:tnLst>
+  </p:timing>
 </p:sld>
 </file>
 
@@ -3118,7 +3590,11 @@
           <a:p>
             <a:r>
               <a:rPr lang="he-IL" dirty="0" smtClean="0"/>
-              <a:t>יצירת מסד משתמשים</a:t>
+              <a:t>יצירת מסד </a:t>
+            </a:r>
+            <a:r>
+              <a:rPr lang="he-IL" dirty="0" smtClean="0"/>
+              <a:t>משתמשים</a:t>
             </a:r>
           </a:p>
           <a:p>
@@ -3139,6 +3615,13 @@
   <p:clrMapOvr>
     <a:masterClrMapping/>
   </p:clrMapOvr>
+  <p:timing>
+    <p:tnLst>
+      <p:par>
+        <p:cTn id="1" dur="indefinite" restart="never" nodeType="tmRoot"/>
+      </p:par>
+    </p:tnLst>
+  </p:timing>
 </p:sld>
 </file>
 
@@ -3225,8 +3708,14 @@
           <a:p>
             <a:r>
               <a:rPr lang="he-IL" dirty="0" smtClean="0"/>
-              <a:t>יצירת ממשק אפליקציה לאנדרואיד.</a:t>
-            </a:r>
+              <a:t>יצירת ממשק אפליקציה לאנדרואיד</a:t>
+            </a:r>
+            <a:r>
+              <a:rPr lang="he-IL" dirty="0" smtClean="0"/>
+              <a:t>.</a:t>
+            </a:r>
+          </a:p>
+          <a:p>
             <a:endParaRPr lang="he-IL" dirty="0"/>
           </a:p>
         </p:txBody>
@@ -3241,6 +3730,13 @@
   <p:clrMapOvr>
     <a:masterClrMapping/>
   </p:clrMapOvr>
+  <p:timing>
+    <p:tnLst>
+      <p:par>
+        <p:cTn id="1" dur="indefinite" restart="never" nodeType="tmRoot"/>
+      </p:par>
+    </p:tnLst>
+  </p:timing>
 </p:sld>
 </file>
 
@@ -3323,6 +3819,13 @@
   <p:clrMapOvr>
     <a:masterClrMapping/>
   </p:clrMapOvr>
+  <p:timing>
+    <p:tnLst>
+      <p:par>
+        <p:cTn id="1" dur="indefinite" restart="never" nodeType="tmRoot"/>
+      </p:par>
+    </p:tnLst>
+  </p:timing>
 </p:sld>
 </file>
 
@@ -3408,6 +3911,13 @@
   <p:clrMapOvr>
     <a:masterClrMapping/>
   </p:clrMapOvr>
+  <p:timing>
+    <p:tnLst>
+      <p:par>
+        <p:cTn id="1" dur="indefinite" restart="never" nodeType="tmRoot"/>
+      </p:par>
+    </p:tnLst>
+  </p:timing>
 </p:sld>
 </file>
 
@@ -3506,13 +4016,20 @@
   <p:clrMapOvr>
     <a:masterClrMapping/>
   </p:clrMapOvr>
+  <p:timing>
+    <p:tnLst>
+      <p:par>
+        <p:cTn id="1" dur="indefinite" restart="never" nodeType="tmRoot"/>
+      </p:par>
+    </p:tnLst>
+  </p:timing>
 </p:sld>
 </file>
 
 <file path=ppt/theme/theme1.xml><?xml version="1.0" encoding="utf-8"?>
-<a:theme xmlns:a="http://schemas.openxmlformats.org/drawingml/2006/main" name="ערכת נושא Office">
+<a:theme xmlns:a="http://schemas.openxmlformats.org/drawingml/2006/main" name="מסגרת ">
   <a:themeElements>
-    <a:clrScheme name="Office">
+    <a:clrScheme name="כחול חם">
       <a:dk1>
         <a:sysClr val="windowText" lastClr="000000"/>
       </a:dk1>
@@ -3520,83 +4037,48 @@
         <a:sysClr val="window" lastClr="FFFFFF"/>
       </a:lt1>
       <a:dk2>
-        <a:srgbClr val="44546A"/>
+        <a:srgbClr val="242852"/>
       </a:dk2>
       <a:lt2>
-        <a:srgbClr val="E7E6E6"/>
+        <a:srgbClr val="ACCBF9"/>
       </a:lt2>
       <a:accent1>
-        <a:srgbClr val="5B9BD5"/>
+        <a:srgbClr val="4A66AC"/>
       </a:accent1>
       <a:accent2>
-        <a:srgbClr val="ED7D31"/>
+        <a:srgbClr val="629DD1"/>
       </a:accent2>
       <a:accent3>
-        <a:srgbClr val="A5A5A5"/>
+        <a:srgbClr val="297FD5"/>
       </a:accent3>
       <a:accent4>
-        <a:srgbClr val="FFC000"/>
+        <a:srgbClr val="7F8FA9"/>
       </a:accent4>
       <a:accent5>
-        <a:srgbClr val="4472C4"/>
+        <a:srgbClr val="5AA2AE"/>
       </a:accent5>
       <a:accent6>
-        <a:srgbClr val="70AD47"/>
+        <a:srgbClr val="9D90A0"/>
       </a:accent6>
       <a:hlink>
-        <a:srgbClr val="0563C1"/>
+        <a:srgbClr val="9454C3"/>
       </a:hlink>
       <a:folHlink>
-        <a:srgbClr val="954F72"/>
+        <a:srgbClr val="3EBBF0"/>
       </a:folHlink>
     </a:clrScheme>
-    <a:fontScheme name="Office">
+    <a:fontScheme name="מסגרת ">
       <a:majorFont>
-        <a:latin typeface="Calibri Light" panose="020F0302020204030204"/>
+        <a:latin typeface="Corbel" panose="020B0503020204020204"/>
         <a:ea typeface=""/>
         <a:cs typeface=""/>
-        <a:font script="Jpan" typeface="ＭＳ Ｐゴシック"/>
-        <a:font script="Hang" typeface="맑은 고딕"/>
-        <a:font script="Hans" typeface="宋体"/>
-        <a:font script="Hant" typeface="新細明體"/>
-        <a:font script="Arab" typeface="Times New Roman"/>
-        <a:font script="Hebr" typeface="Times New Roman"/>
-        <a:font script="Thai" typeface="Angsana New"/>
-        <a:font script="Ethi" typeface="Nyala"/>
-        <a:font script="Beng" typeface="Vrinda"/>
-        <a:font script="Gujr" typeface="Shruti"/>
-        <a:font script="Khmr" typeface="MoolBoran"/>
-        <a:font script="Knda" typeface="Tunga"/>
-        <a:font script="Guru" typeface="Raavi"/>
-        <a:font script="Cans" typeface="Euphemia"/>
-        <a:font script="Cher" typeface="Plantagenet Cherokee"/>
-        <a:font script="Yiii" typeface="Microsoft Yi Baiti"/>
-        <a:font script="Tibt" typeface="Microsoft Himalaya"/>
-        <a:font script="Thaa" typeface="MV Boli"/>
-        <a:font script="Deva" typeface="Mangal"/>
-        <a:font script="Telu" typeface="Gautami"/>
-        <a:font script="Taml" typeface="Latha"/>
-        <a:font script="Syrc" typeface="Estrangelo Edessa"/>
-        <a:font script="Orya" typeface="Kalinga"/>
-        <a:font script="Mlym" typeface="Kartika"/>
-        <a:font script="Laoo" typeface="DokChampa"/>
-        <a:font script="Sinh" typeface="Iskoola Pota"/>
-        <a:font script="Mong" typeface="Mongolian Baiti"/>
-        <a:font script="Viet" typeface="Times New Roman"/>
-        <a:font script="Uigh" typeface="Microsoft Uighur"/>
-        <a:font script="Geor" typeface="Sylfaen"/>
-      </a:majorFont>
-      <a:minorFont>
-        <a:latin typeface="Calibri" panose="020F0502020204030204"/>
-        <a:ea typeface=""/>
-        <a:cs typeface=""/>
-        <a:font script="Jpan" typeface="ＭＳ Ｐゴシック"/>
-        <a:font script="Hang" typeface="맑은 고딕"/>
-        <a:font script="Hans" typeface="宋体"/>
-        <a:font script="Hant" typeface="新細明體"/>
-        <a:font script="Arab" typeface="Arial"/>
-        <a:font script="Hebr" typeface="Arial"/>
-        <a:font script="Thai" typeface="Cordia New"/>
+        <a:font script="Jpan" typeface="ＭＳ ゴシック"/>
+        <a:font script="Hang" typeface="HY중고딕"/>
+        <a:font script="Hans" typeface="幼圆"/>
+        <a:font script="Hant" typeface="微軟正黑體"/>
+        <a:font script="Arab" typeface="Tahoma"/>
+        <a:font script="Hebr" typeface="Gisha"/>
+        <a:font script="Thai" typeface="DilleniaUPC"/>
         <a:font script="Ethi" typeface="Nyala"/>
         <a:font script="Beng" typeface="Vrinda"/>
         <a:font script="Gujr" typeface="Shruti"/>
@@ -3617,90 +4099,85 @@
         <a:font script="Laoo" typeface="DokChampa"/>
         <a:font script="Sinh" typeface="Iskoola Pota"/>
         <a:font script="Mong" typeface="Mongolian Baiti"/>
-        <a:font script="Viet" typeface="Arial"/>
+        <a:font script="Viet" typeface="Tahoma"/>
+        <a:font script="Uigh" typeface="Microsoft Uighur"/>
+        <a:font script="Geor" typeface="Sylfaen"/>
+      </a:majorFont>
+      <a:minorFont>
+        <a:latin typeface="Corbel" panose="020B0503020204020204"/>
+        <a:ea typeface=""/>
+        <a:cs typeface=""/>
+        <a:font script="Jpan" typeface="ＭＳ ゴシック"/>
+        <a:font script="Hang" typeface="HY중고딕"/>
+        <a:font script="Hans" typeface="幼圆"/>
+        <a:font script="Hant" typeface="微軟正黑體"/>
+        <a:font script="Arab" typeface="Tahoma"/>
+        <a:font script="Hebr" typeface="Gisha"/>
+        <a:font script="Thai" typeface="DilleniaUPC"/>
+        <a:font script="Ethi" typeface="Nyala"/>
+        <a:font script="Beng" typeface="Vrinda"/>
+        <a:font script="Gujr" typeface="Shruti"/>
+        <a:font script="Khmr" typeface="DaunPenh"/>
+        <a:font script="Knda" typeface="Tunga"/>
+        <a:font script="Guru" typeface="Raavi"/>
+        <a:font script="Cans" typeface="Euphemia"/>
+        <a:font script="Cher" typeface="Plantagenet Cherokee"/>
+        <a:font script="Yiii" typeface="Microsoft Yi Baiti"/>
+        <a:font script="Tibt" typeface="Microsoft Himalaya"/>
+        <a:font script="Thaa" typeface="MV Boli"/>
+        <a:font script="Deva" typeface="Mangal"/>
+        <a:font script="Telu" typeface="Gautami"/>
+        <a:font script="Taml" typeface="Latha"/>
+        <a:font script="Syrc" typeface="Estrangelo Edessa"/>
+        <a:font script="Orya" typeface="Kalinga"/>
+        <a:font script="Mlym" typeface="Kartika"/>
+        <a:font script="Laoo" typeface="DokChampa"/>
+        <a:font script="Sinh" typeface="Iskoola Pota"/>
+        <a:font script="Mong" typeface="Mongolian Baiti"/>
+        <a:font script="Viet" typeface="Verdana"/>
         <a:font script="Uigh" typeface="Microsoft Uighur"/>
         <a:font script="Geor" typeface="Sylfaen"/>
       </a:minorFont>
     </a:fontScheme>
-    <a:fmtScheme name="Office">
+    <a:fmtScheme name="מסגרת ">
       <a:fillStyleLst>
         <a:solidFill>
           <a:schemeClr val="phClr"/>
         </a:solidFill>
-        <a:gradFill rotWithShape="1">
-          <a:gsLst>
-            <a:gs pos="0">
-              <a:schemeClr val="phClr">
-                <a:lumMod val="110000"/>
-                <a:satMod val="105000"/>
-                <a:tint val="67000"/>
-              </a:schemeClr>
-            </a:gs>
-            <a:gs pos="50000">
-              <a:schemeClr val="phClr">
-                <a:lumMod val="105000"/>
-                <a:satMod val="103000"/>
-                <a:tint val="73000"/>
-              </a:schemeClr>
-            </a:gs>
-            <a:gs pos="100000">
-              <a:schemeClr val="phClr">
-                <a:lumMod val="105000"/>
-                <a:satMod val="109000"/>
-                <a:tint val="81000"/>
-              </a:schemeClr>
-            </a:gs>
-          </a:gsLst>
-          <a:lin ang="5400000" scaled="0"/>
-        </a:gradFill>
-        <a:gradFill rotWithShape="1">
-          <a:gsLst>
-            <a:gs pos="0">
-              <a:schemeClr val="phClr">
-                <a:satMod val="103000"/>
-                <a:lumMod val="102000"/>
-                <a:tint val="94000"/>
-              </a:schemeClr>
-            </a:gs>
-            <a:gs pos="50000">
-              <a:schemeClr val="phClr">
-                <a:satMod val="110000"/>
-                <a:lumMod val="100000"/>
-                <a:shade val="100000"/>
-              </a:schemeClr>
-            </a:gs>
-            <a:gs pos="100000">
-              <a:schemeClr val="phClr">
-                <a:lumMod val="99000"/>
-                <a:satMod val="120000"/>
-                <a:shade val="78000"/>
-              </a:schemeClr>
-            </a:gs>
-          </a:gsLst>
-          <a:lin ang="5400000" scaled="0"/>
-        </a:gradFill>
+        <a:solidFill>
+          <a:schemeClr val="phClr">
+            <a:tint val="65000"/>
+          </a:schemeClr>
+        </a:solidFill>
+        <a:solidFill>
+          <a:schemeClr val="phClr">
+            <a:shade val="80000"/>
+            <a:satMod val="150000"/>
+          </a:schemeClr>
+        </a:solidFill>
       </a:fillStyleLst>
       <a:lnStyleLst>
-        <a:ln w="6350" cap="flat" cmpd="sng" algn="ctr">
+        <a:ln w="9525" cap="flat" cmpd="sng" algn="ctr">
           <a:solidFill>
             <a:schemeClr val="phClr"/>
           </a:solidFill>
           <a:prstDash val="solid"/>
-          <a:miter lim="800000"/>
         </a:ln>
-        <a:ln w="12700" cap="flat" cmpd="sng" algn="ctr">
+        <a:ln w="10795" cap="flat" cmpd="sng" algn="ctr">
           <a:solidFill>
             <a:schemeClr val="phClr"/>
           </a:solidFill>
           <a:prstDash val="solid"/>
-          <a:miter lim="800000"/>
         </a:ln>
-        <a:ln w="19050" cap="flat" cmpd="sng" algn="ctr">
+        <a:ln w="17145" cap="flat" cmpd="sng" algn="ctr">
           <a:solidFill>
-            <a:schemeClr val="phClr"/>
+            <a:schemeClr val="phClr">
+              <a:shade val="95000"/>
+              <a:alpha val="50000"/>
+              <a:satMod val="150000"/>
+            </a:schemeClr>
           </a:solidFill>
           <a:prstDash val="solid"/>
-          <a:miter lim="800000"/>
         </a:ln>
       </a:lnStyleLst>
       <a:effectStyleLst>
@@ -3712,12 +4189,21 @@
         </a:effectStyle>
         <a:effectStyle>
           <a:effectLst>
-            <a:outerShdw blurRad="57150" dist="19050" dir="5400000" algn="ctr" rotWithShape="0">
+            <a:outerShdw blurRad="44450" dist="13970" dir="5400000" algn="ctr" rotWithShape="0">
               <a:srgbClr val="000000">
-                <a:alpha val="63000"/>
+                <a:alpha val="45000"/>
               </a:srgbClr>
             </a:outerShdw>
           </a:effectLst>
+          <a:scene3d>
+            <a:camera prst="orthographicFront">
+              <a:rot lat="0" lon="0" rev="0"/>
+            </a:camera>
+            <a:lightRig rig="twoPt" dir="tl"/>
+          </a:scene3d>
+          <a:sp3d prstMaterial="flat">
+            <a:bevelT w="12700" h="25400" prst="coolSlant"/>
+          </a:sp3d>
         </a:effectStyle>
       </a:effectStyleLst>
       <a:bgFillStyleLst>
@@ -3735,23 +4221,24 @@
             <a:gs pos="0">
               <a:schemeClr val="phClr">
                 <a:tint val="93000"/>
-                <a:satMod val="150000"/>
                 <a:shade val="98000"/>
+                <a:satMod val="120000"/>
                 <a:lumMod val="102000"/>
               </a:schemeClr>
             </a:gs>
-            <a:gs pos="50000">
+            <a:gs pos="48000">
               <a:schemeClr val="phClr">
                 <a:tint val="98000"/>
-                <a:satMod val="130000"/>
                 <a:shade val="90000"/>
+                <a:satMod val="110000"/>
                 <a:lumMod val="103000"/>
               </a:schemeClr>
             </a:gs>
             <a:gs pos="100000">
               <a:schemeClr val="phClr">
-                <a:shade val="63000"/>
-                <a:satMod val="120000"/>
+                <a:tint val="98000"/>
+                <a:shade val="80000"/>
+                <a:satMod val="100000"/>
               </a:schemeClr>
             </a:gs>
           </a:gsLst>
@@ -3764,7 +4251,7 @@
   <a:extraClrSchemeLst/>
   <a:extLst>
     <a:ext uri="{05A4C25C-085E-4340-85A3-A5531E510DB2}">
-      <thm15:themeFamily xmlns:thm15="http://schemas.microsoft.com/office/thememl/2012/main" name="Office Theme" id="{62F939B6-93AF-4DB8-9C6B-D6C7DFDC589F}" vid="{4A3C46E8-61CC-4603-A589-7422A47A8E4A}"/>
+      <thm15:themeFamily xmlns:thm15="http://schemas.microsoft.com/office/thememl/2012/main" name="Frame" id="{F226E7A2-7162-461C-9490-D27D9DC04E43}" vid="{9935E573-C197-41A8-BCA1-5D5F62C560B7}"/>
     </a:ext>
   </a:extLst>
 </a:theme>

</xml_diff>